<commit_message>
Funktionierendes Programm, neue Titelseite
</commit_message>
<xml_diff>
--- a/Präsentation/Softwareingeneering Präse V1.5.pptx
+++ b/Präsentation/Softwareingeneering Präse V1.5.pptx
@@ -2,7 +2,7 @@
 <file path=ppt/presentation.xml><?xml version="1.0" encoding="utf-8"?>
 <p:presentation xmlns:a="http://schemas.openxmlformats.org/drawingml/2006/main" xmlns:r="http://schemas.openxmlformats.org/officeDocument/2006/relationships" xmlns:p="http://schemas.openxmlformats.org/presentationml/2006/main" saveSubsetFonts="1">
   <p:sldMasterIdLst>
-    <p:sldMasterId id="2147483696" r:id="rId1"/>
+    <p:sldMasterId id="2147483737" r:id="rId1"/>
   </p:sldMasterIdLst>
   <p:notesMasterIdLst>
     <p:notesMasterId r:id="rId14"/>
@@ -203,7 +203,7 @@
           <a:p>
             <a:fld id="{AF40CB2E-1BD5-4686-BBC2-86C574B6A27D}" type="datetimeFigureOut">
               <a:rPr lang="en-US" smtClean="0"/>
-              <a:t>11/17/2014</a:t>
+              <a:t>19.11.14</a:t>
             </a:fld>
             <a:endParaRPr lang="en-US"/>
           </a:p>
@@ -362,7 +362,7 @@
           <a:p>
             <a:fld id="{36723E82-D824-4F48-AE87-D2E8FF1F95A9}" type="slidenum">
               <a:rPr lang="en-US" smtClean="0"/>
-              <a:t>‹#›</a:t>
+              <a:t>‹Nr.›</a:t>
             </a:fld>
             <a:endParaRPr lang="en-US"/>
           </a:p>
@@ -833,7 +833,7 @@
 
 <file path=ppt/slideLayouts/slideLayout1.xml><?xml version="1.0" encoding="utf-8"?>
 <p:sldLayout xmlns:a="http://schemas.openxmlformats.org/drawingml/2006/main" xmlns:r="http://schemas.openxmlformats.org/officeDocument/2006/relationships" xmlns:p="http://schemas.openxmlformats.org/presentationml/2006/main" type="title" preserve="1">
-  <p:cSld name="Title Slide">
+  <p:cSld name="Titelfolie">
     <p:spTree>
       <p:nvGrpSpPr>
         <p:cNvPr id="1" name=""/>
@@ -860,19 +860,25 @@
         </p:nvSpPr>
         <p:spPr>
           <a:xfrm>
-            <a:off x="685800" y="2130425"/>
-            <a:ext cx="7772400" cy="1470025"/>
+            <a:off x="685800" y="1371600"/>
+            <a:ext cx="7848600" cy="1927225"/>
           </a:xfrm>
         </p:spPr>
         <p:txBody>
-          <a:bodyPr/>
-          <a:lstStyle/>
-          <a:p>
-            <a:r>
-              <a:rPr lang="en-US" smtClean="0"/>
-              <a:t>Click to edit Master title style</a:t>
-            </a:r>
-            <a:endParaRPr lang="en-US"/>
+          <a:bodyPr anchor="b">
+            <a:noAutofit/>
+          </a:bodyPr>
+          <a:lstStyle>
+            <a:lvl1pPr>
+              <a:defRPr sz="5400" cap="all" baseline="0"/>
+            </a:lvl1pPr>
+          </a:lstStyle>
+          <a:p>
+            <a:r>
+              <a:rPr lang="de-DE" smtClean="0"/>
+              <a:t>Mastertitelformat bearbeiten</a:t>
+            </a:r>
+            <a:endParaRPr lang="en-US" dirty="0"/>
           </a:p>
         </p:txBody>
       </p:sp>
@@ -888,19 +894,20 @@
         </p:nvSpPr>
         <p:spPr>
           <a:xfrm>
-            <a:off x="1371600" y="3886200"/>
+            <a:off x="685800" y="3505200"/>
             <a:ext cx="6400800" cy="1752600"/>
           </a:xfrm>
         </p:spPr>
         <p:txBody>
           <a:bodyPr/>
           <a:lstStyle>
-            <a:lvl1pPr marL="0" indent="0" algn="ctr">
+            <a:lvl1pPr marL="0" indent="0" algn="l">
               <a:buNone/>
               <a:defRPr>
                 <a:solidFill>
                   <a:schemeClr val="tx1">
-                    <a:tint val="75000"/>
+                    <a:lumMod val="75000"/>
+                    <a:lumOff val="25000"/>
                   </a:schemeClr>
                 </a:solidFill>
               </a:defRPr>
@@ -988,10 +995,10 @@
           </a:lstStyle>
           <a:p>
             <a:r>
-              <a:rPr lang="en-US" smtClean="0"/>
-              <a:t>Click to edit Master subtitle style</a:t>
-            </a:r>
-            <a:endParaRPr lang="en-US"/>
+              <a:rPr lang="de-DE" smtClean="0"/>
+              <a:t>Master-Untertitelformat bearbeiten</a:t>
+            </a:r>
+            <a:endParaRPr lang="en-US" dirty="0"/>
           </a:p>
         </p:txBody>
       </p:sp>
@@ -1012,7 +1019,7 @@
           <a:p>
             <a:fld id="{A6E1CF3F-0DEA-4407-8E52-E5B22F30EA25}" type="datetimeFigureOut">
               <a:rPr lang="en-US" smtClean="0"/>
-              <a:t>11/17/2014</a:t>
+              <a:t>19.11.14</a:t>
             </a:fld>
             <a:endParaRPr lang="en-US"/>
           </a:p>
@@ -1054,18 +1061,48 @@
           <a:p>
             <a:fld id="{ADB383D6-0BC4-4E7D-BDD7-026B00AED181}" type="slidenum">
               <a:rPr lang="en-US" smtClean="0"/>
-              <a:t>‹#›</a:t>
+              <a:t>‹Nr.›</a:t>
             </a:fld>
             <a:endParaRPr lang="en-US"/>
           </a:p>
         </p:txBody>
       </p:sp>
+      <p:cxnSp>
+        <p:nvCxnSpPr>
+          <p:cNvPr id="8" name="Straight Connector 7"/>
+          <p:cNvCxnSpPr/>
+          <p:nvPr/>
+        </p:nvCxnSpPr>
+        <p:spPr>
+          <a:xfrm>
+            <a:off x="685800" y="3398520"/>
+            <a:ext cx="7848600" cy="1588"/>
+          </a:xfrm>
+          <a:prstGeom prst="line">
+            <a:avLst/>
+          </a:prstGeom>
+          <a:ln w="19050">
+            <a:solidFill>
+              <a:schemeClr val="tx2"/>
+            </a:solidFill>
+          </a:ln>
+        </p:spPr>
+        <p:style>
+          <a:lnRef idx="1">
+            <a:schemeClr val="accent1"/>
+          </a:lnRef>
+          <a:fillRef idx="0">
+            <a:schemeClr val="accent1"/>
+          </a:fillRef>
+          <a:effectRef idx="0">
+            <a:schemeClr val="accent1"/>
+          </a:effectRef>
+          <a:fontRef idx="minor">
+            <a:schemeClr val="tx1"/>
+          </a:fontRef>
+        </p:style>
+      </p:cxnSp>
     </p:spTree>
-    <p:extLst>
-      <p:ext uri="{BB962C8B-B14F-4D97-AF65-F5344CB8AC3E}">
-        <p14:creationId xmlns:p14="http://schemas.microsoft.com/office/powerpoint/2010/main" val="1166852731"/>
-      </p:ext>
-    </p:extLst>
   </p:cSld>
   <p:clrMapOvr>
     <a:masterClrMapping/>
@@ -1075,7 +1112,7 @@
 
 <file path=ppt/slideLayouts/slideLayout10.xml><?xml version="1.0" encoding="utf-8"?>
 <p:sldLayout xmlns:a="http://schemas.openxmlformats.org/drawingml/2006/main" xmlns:r="http://schemas.openxmlformats.org/officeDocument/2006/relationships" xmlns:p="http://schemas.openxmlformats.org/presentationml/2006/main" type="vertTx" preserve="1">
-  <p:cSld name="Title and Vertical Text">
+  <p:cSld name="Titel und vertikaler Text">
     <p:spTree>
       <p:nvGrpSpPr>
         <p:cNvPr id="1" name=""/>
@@ -1106,8 +1143,8 @@
           <a:lstStyle/>
           <a:p>
             <a:r>
-              <a:rPr lang="en-US" smtClean="0"/>
-              <a:t>Click to edit Master title style</a:t>
+              <a:rPr lang="de-DE" smtClean="0"/>
+              <a:t>Mastertitelformat bearbeiten</a:t>
             </a:r>
             <a:endParaRPr lang="en-US"/>
           </a:p>
@@ -1130,36 +1167,36 @@
           <a:p>
             <a:pPr lvl="0"/>
             <a:r>
-              <a:rPr lang="en-US" smtClean="0"/>
-              <a:t>Click to edit Master text styles</a:t>
+              <a:rPr lang="de-DE" smtClean="0"/>
+              <a:t>Mastertextformat bearbeiten</a:t>
             </a:r>
           </a:p>
           <a:p>
             <a:pPr lvl="1"/>
             <a:r>
-              <a:rPr lang="en-US" smtClean="0"/>
-              <a:t>Second level</a:t>
+              <a:rPr lang="de-DE" smtClean="0"/>
+              <a:t>Zweite Ebene</a:t>
             </a:r>
           </a:p>
           <a:p>
             <a:pPr lvl="2"/>
             <a:r>
-              <a:rPr lang="en-US" smtClean="0"/>
-              <a:t>Third level</a:t>
+              <a:rPr lang="de-DE" smtClean="0"/>
+              <a:t>Dritte Ebene</a:t>
             </a:r>
           </a:p>
           <a:p>
             <a:pPr lvl="3"/>
             <a:r>
-              <a:rPr lang="en-US" smtClean="0"/>
-              <a:t>Fourth level</a:t>
+              <a:rPr lang="de-DE" smtClean="0"/>
+              <a:t>Vierte Ebene</a:t>
             </a:r>
           </a:p>
           <a:p>
             <a:pPr lvl="4"/>
             <a:r>
-              <a:rPr lang="en-US" smtClean="0"/>
-              <a:t>Fifth level</a:t>
+              <a:rPr lang="de-DE" smtClean="0"/>
+              <a:t>Fünfte Ebene</a:t>
             </a:r>
             <a:endParaRPr lang="en-US"/>
           </a:p>
@@ -1182,7 +1219,7 @@
           <a:p>
             <a:fld id="{A6E1CF3F-0DEA-4407-8E52-E5B22F30EA25}" type="datetimeFigureOut">
               <a:rPr lang="en-US" smtClean="0"/>
-              <a:t>11/17/2014</a:t>
+              <a:t>19.11.14</a:t>
             </a:fld>
             <a:endParaRPr lang="en-US"/>
           </a:p>
@@ -1224,18 +1261,13 @@
           <a:p>
             <a:fld id="{ADB383D6-0BC4-4E7D-BDD7-026B00AED181}" type="slidenum">
               <a:rPr lang="en-US" smtClean="0"/>
-              <a:t>‹#›</a:t>
+              <a:t>‹Nr.›</a:t>
             </a:fld>
             <a:endParaRPr lang="en-US"/>
           </a:p>
         </p:txBody>
       </p:sp>
     </p:spTree>
-    <p:extLst>
-      <p:ext uri="{BB962C8B-B14F-4D97-AF65-F5344CB8AC3E}">
-        <p14:creationId xmlns:p14="http://schemas.microsoft.com/office/powerpoint/2010/main" val="3301557719"/>
-      </p:ext>
-    </p:extLst>
   </p:cSld>
   <p:clrMapOvr>
     <a:masterClrMapping/>
@@ -1245,7 +1277,7 @@
 
 <file path=ppt/slideLayouts/slideLayout11.xml><?xml version="1.0" encoding="utf-8"?>
 <p:sldLayout xmlns:a="http://schemas.openxmlformats.org/drawingml/2006/main" xmlns:r="http://schemas.openxmlformats.org/officeDocument/2006/relationships" xmlns:p="http://schemas.openxmlformats.org/presentationml/2006/main" type="vertTitleAndTx" preserve="1">
-  <p:cSld name="Vertical Title and Text">
+  <p:cSld name="Vertikaler Titel und Text">
     <p:spTree>
       <p:nvGrpSpPr>
         <p:cNvPr id="1" name=""/>
@@ -1272,76 +1304,76 @@
         </p:nvSpPr>
         <p:spPr>
           <a:xfrm>
-            <a:off x="6629400" y="274638"/>
-            <a:ext cx="2057400" cy="5851525"/>
+            <a:off x="6629400" y="609600"/>
+            <a:ext cx="2057400" cy="5867400"/>
+          </a:xfrm>
+        </p:spPr>
+        <p:txBody>
+          <a:bodyPr vert="eaVert" anchor="b"/>
+          <a:lstStyle/>
+          <a:p>
+            <a:r>
+              <a:rPr lang="de-DE" smtClean="0"/>
+              <a:t>Mastertitelformat bearbeiten</a:t>
+            </a:r>
+            <a:endParaRPr lang="en-US" dirty="0"/>
+          </a:p>
+        </p:txBody>
+      </p:sp>
+      <p:sp>
+        <p:nvSpPr>
+          <p:cNvPr id="3" name="Vertical Text Placeholder 2"/>
+          <p:cNvSpPr>
+            <a:spLocks noGrp="1"/>
+          </p:cNvSpPr>
+          <p:nvPr>
+            <p:ph type="body" orient="vert" idx="1"/>
+          </p:nvPr>
+        </p:nvSpPr>
+        <p:spPr>
+          <a:xfrm>
+            <a:off x="457200" y="609600"/>
+            <a:ext cx="6019800" cy="5867400"/>
           </a:xfrm>
         </p:spPr>
         <p:txBody>
           <a:bodyPr vert="eaVert"/>
           <a:lstStyle/>
           <a:p>
-            <a:r>
-              <a:rPr lang="en-US" smtClean="0"/>
-              <a:t>Click to edit Master title style</a:t>
-            </a:r>
-            <a:endParaRPr lang="en-US"/>
-          </a:p>
-        </p:txBody>
-      </p:sp>
-      <p:sp>
-        <p:nvSpPr>
-          <p:cNvPr id="3" name="Vertical Text Placeholder 2"/>
-          <p:cNvSpPr>
-            <a:spLocks noGrp="1"/>
-          </p:cNvSpPr>
-          <p:nvPr>
-            <p:ph type="body" orient="vert" idx="1"/>
-          </p:nvPr>
-        </p:nvSpPr>
-        <p:spPr>
-          <a:xfrm>
-            <a:off x="457200" y="274638"/>
-            <a:ext cx="6019800" cy="5851525"/>
-          </a:xfrm>
-        </p:spPr>
-        <p:txBody>
-          <a:bodyPr vert="eaVert"/>
-          <a:lstStyle/>
-          <a:p>
             <a:pPr lvl="0"/>
             <a:r>
-              <a:rPr lang="en-US" smtClean="0"/>
-              <a:t>Click to edit Master text styles</a:t>
+              <a:rPr lang="de-DE" smtClean="0"/>
+              <a:t>Mastertextformat bearbeiten</a:t>
             </a:r>
           </a:p>
           <a:p>
             <a:pPr lvl="1"/>
             <a:r>
-              <a:rPr lang="en-US" smtClean="0"/>
-              <a:t>Second level</a:t>
+              <a:rPr lang="de-DE" smtClean="0"/>
+              <a:t>Zweite Ebene</a:t>
             </a:r>
           </a:p>
           <a:p>
             <a:pPr lvl="2"/>
             <a:r>
-              <a:rPr lang="en-US" smtClean="0"/>
-              <a:t>Third level</a:t>
+              <a:rPr lang="de-DE" smtClean="0"/>
+              <a:t>Dritte Ebene</a:t>
             </a:r>
           </a:p>
           <a:p>
             <a:pPr lvl="3"/>
             <a:r>
-              <a:rPr lang="en-US" smtClean="0"/>
-              <a:t>Fourth level</a:t>
+              <a:rPr lang="de-DE" smtClean="0"/>
+              <a:t>Vierte Ebene</a:t>
             </a:r>
           </a:p>
           <a:p>
             <a:pPr lvl="4"/>
             <a:r>
-              <a:rPr lang="en-US" smtClean="0"/>
-              <a:t>Fifth level</a:t>
-            </a:r>
-            <a:endParaRPr lang="en-US"/>
+              <a:rPr lang="de-DE" smtClean="0"/>
+              <a:t>Fünfte Ebene</a:t>
+            </a:r>
+            <a:endParaRPr lang="en-US" dirty="0"/>
           </a:p>
         </p:txBody>
       </p:sp>
@@ -1362,7 +1394,7 @@
           <a:p>
             <a:fld id="{A6E1CF3F-0DEA-4407-8E52-E5B22F30EA25}" type="datetimeFigureOut">
               <a:rPr lang="en-US" smtClean="0"/>
-              <a:t>11/17/2014</a:t>
+              <a:t>19.11.14</a:t>
             </a:fld>
             <a:endParaRPr lang="en-US"/>
           </a:p>
@@ -1404,18 +1436,13 @@
           <a:p>
             <a:fld id="{ADB383D6-0BC4-4E7D-BDD7-026B00AED181}" type="slidenum">
               <a:rPr lang="en-US" smtClean="0"/>
-              <a:t>‹#›</a:t>
+              <a:t>‹Nr.›</a:t>
             </a:fld>
             <a:endParaRPr lang="en-US"/>
           </a:p>
         </p:txBody>
       </p:sp>
     </p:spTree>
-    <p:extLst>
-      <p:ext uri="{BB962C8B-B14F-4D97-AF65-F5344CB8AC3E}">
-        <p14:creationId xmlns:p14="http://schemas.microsoft.com/office/powerpoint/2010/main" val="2320755437"/>
-      </p:ext>
-    </p:extLst>
   </p:cSld>
   <p:clrMapOvr>
     <a:masterClrMapping/>
@@ -1425,7 +1452,7 @@
 
 <file path=ppt/slideLayouts/slideLayout2.xml><?xml version="1.0" encoding="utf-8"?>
 <p:sldLayout xmlns:a="http://schemas.openxmlformats.org/drawingml/2006/main" xmlns:r="http://schemas.openxmlformats.org/officeDocument/2006/relationships" xmlns:p="http://schemas.openxmlformats.org/presentationml/2006/main" type="obj" preserve="1">
-  <p:cSld name="Title and Content">
+  <p:cSld name="Titel und Inhalt">
     <p:spTree>
       <p:nvGrpSpPr>
         <p:cNvPr id="1" name=""/>
@@ -1456,8 +1483,8 @@
           <a:lstStyle/>
           <a:p>
             <a:r>
-              <a:rPr lang="en-US" smtClean="0"/>
-              <a:t>Click to edit Master title style</a:t>
+              <a:rPr lang="de-DE" smtClean="0"/>
+              <a:t>Mastertitelformat bearbeiten</a:t>
             </a:r>
             <a:endParaRPr lang="en-US"/>
           </a:p>
@@ -1480,36 +1507,36 @@
           <a:p>
             <a:pPr lvl="0"/>
             <a:r>
-              <a:rPr lang="en-US" smtClean="0"/>
-              <a:t>Click to edit Master text styles</a:t>
+              <a:rPr lang="de-DE" smtClean="0"/>
+              <a:t>Mastertextformat bearbeiten</a:t>
             </a:r>
           </a:p>
           <a:p>
             <a:pPr lvl="1"/>
             <a:r>
-              <a:rPr lang="en-US" smtClean="0"/>
-              <a:t>Second level</a:t>
+              <a:rPr lang="de-DE" smtClean="0"/>
+              <a:t>Zweite Ebene</a:t>
             </a:r>
           </a:p>
           <a:p>
             <a:pPr lvl="2"/>
             <a:r>
-              <a:rPr lang="en-US" smtClean="0"/>
-              <a:t>Third level</a:t>
+              <a:rPr lang="de-DE" smtClean="0"/>
+              <a:t>Dritte Ebene</a:t>
             </a:r>
           </a:p>
           <a:p>
             <a:pPr lvl="3"/>
             <a:r>
-              <a:rPr lang="en-US" smtClean="0"/>
-              <a:t>Fourth level</a:t>
+              <a:rPr lang="de-DE" smtClean="0"/>
+              <a:t>Vierte Ebene</a:t>
             </a:r>
           </a:p>
           <a:p>
             <a:pPr lvl="4"/>
             <a:r>
-              <a:rPr lang="en-US" smtClean="0"/>
-              <a:t>Fifth level</a:t>
+              <a:rPr lang="de-DE" smtClean="0"/>
+              <a:t>Fünfte Ebene</a:t>
             </a:r>
             <a:endParaRPr lang="en-US"/>
           </a:p>
@@ -1532,7 +1559,7 @@
           <a:p>
             <a:fld id="{A6E1CF3F-0DEA-4407-8E52-E5B22F30EA25}" type="datetimeFigureOut">
               <a:rPr lang="en-US" smtClean="0"/>
-              <a:t>11/17/2014</a:t>
+              <a:t>19.11.14</a:t>
             </a:fld>
             <a:endParaRPr lang="en-US"/>
           </a:p>
@@ -1574,18 +1601,13 @@
           <a:p>
             <a:fld id="{ADB383D6-0BC4-4E7D-BDD7-026B00AED181}" type="slidenum">
               <a:rPr lang="en-US" smtClean="0"/>
-              <a:t>‹#›</a:t>
+              <a:t>‹Nr.›</a:t>
             </a:fld>
             <a:endParaRPr lang="en-US"/>
           </a:p>
         </p:txBody>
       </p:sp>
     </p:spTree>
-    <p:extLst>
-      <p:ext uri="{BB962C8B-B14F-4D97-AF65-F5344CB8AC3E}">
-        <p14:creationId xmlns:p14="http://schemas.microsoft.com/office/powerpoint/2010/main" val="457469726"/>
-      </p:ext>
-    </p:extLst>
   </p:cSld>
   <p:clrMapOvr>
     <a:masterClrMapping/>
@@ -1595,7 +1617,12 @@
 
 <file path=ppt/slideLayouts/slideLayout3.xml><?xml version="1.0" encoding="utf-8"?>
 <p:sldLayout xmlns:a="http://schemas.openxmlformats.org/drawingml/2006/main" xmlns:r="http://schemas.openxmlformats.org/officeDocument/2006/relationships" xmlns:p="http://schemas.openxmlformats.org/presentationml/2006/main" type="secHead" preserve="1">
-  <p:cSld name="Section Header">
+  <p:cSld name="Abschnittsüberschrift">
+    <p:bg>
+      <p:bgRef idx="1001">
+        <a:schemeClr val="bg2"/>
+      </p:bgRef>
+    </p:bg>
     <p:spTree>
       <p:nvGrpSpPr>
         <p:cNvPr id="1" name=""/>
@@ -1622,23 +1649,25 @@
         </p:nvSpPr>
         <p:spPr>
           <a:xfrm>
-            <a:off x="722313" y="4406900"/>
-            <a:ext cx="7772400" cy="1362075"/>
+            <a:off x="722313" y="2362200"/>
+            <a:ext cx="7772400" cy="2200275"/>
           </a:xfrm>
         </p:spPr>
         <p:txBody>
-          <a:bodyPr anchor="t"/>
+          <a:bodyPr anchor="b">
+            <a:normAutofit/>
+          </a:bodyPr>
           <a:lstStyle>
             <a:lvl1pPr algn="l">
-              <a:defRPr sz="4000" b="1" cap="all"/>
+              <a:defRPr sz="4800" b="0" cap="all"/>
             </a:lvl1pPr>
           </a:lstStyle>
           <a:p>
             <a:r>
-              <a:rPr lang="en-US" smtClean="0"/>
-              <a:t>Click to edit Master title style</a:t>
-            </a:r>
-            <a:endParaRPr lang="en-US"/>
+              <a:rPr lang="de-DE" smtClean="0"/>
+              <a:t>Mastertitelformat bearbeiten</a:t>
+            </a:r>
+            <a:endParaRPr lang="en-US" dirty="0"/>
           </a:p>
         </p:txBody>
       </p:sp>
@@ -1654,20 +1683,20 @@
         </p:nvSpPr>
         <p:spPr>
           <a:xfrm>
-            <a:off x="722313" y="2906713"/>
+            <a:off x="722313" y="4626864"/>
             <a:ext cx="7772400" cy="1500187"/>
           </a:xfrm>
         </p:spPr>
         <p:txBody>
-          <a:bodyPr anchor="b"/>
+          <a:bodyPr anchor="t">
+            <a:normAutofit/>
+          </a:bodyPr>
           <a:lstStyle>
             <a:lvl1pPr marL="0" indent="0">
               <a:buNone/>
-              <a:defRPr sz="2000">
+              <a:defRPr sz="2400">
                 <a:solidFill>
-                  <a:schemeClr val="tx1">
-                    <a:tint val="75000"/>
-                  </a:schemeClr>
+                  <a:schemeClr val="tx2"/>
                 </a:solidFill>
               </a:defRPr>
             </a:lvl1pPr>
@@ -1755,8 +1784,8 @@
           <a:p>
             <a:pPr lvl="0"/>
             <a:r>
-              <a:rPr lang="en-US" smtClean="0"/>
-              <a:t>Click to edit Master text styles</a:t>
+              <a:rPr lang="de-DE" smtClean="0"/>
+              <a:t>Mastertextformat bearbeiten</a:t>
             </a:r>
           </a:p>
         </p:txBody>
@@ -1778,7 +1807,7 @@
           <a:p>
             <a:fld id="{A6E1CF3F-0DEA-4407-8E52-E5B22F30EA25}" type="datetimeFigureOut">
               <a:rPr lang="en-US" smtClean="0"/>
-              <a:t>11/17/2014</a:t>
+              <a:t>19.11.14</a:t>
             </a:fld>
             <a:endParaRPr lang="en-US"/>
           </a:p>
@@ -1820,28 +1849,58 @@
           <a:p>
             <a:fld id="{ADB383D6-0BC4-4E7D-BDD7-026B00AED181}" type="slidenum">
               <a:rPr lang="en-US" smtClean="0"/>
-              <a:t>‹#›</a:t>
+              <a:t>‹Nr.›</a:t>
             </a:fld>
             <a:endParaRPr lang="en-US"/>
           </a:p>
         </p:txBody>
       </p:sp>
+      <p:cxnSp>
+        <p:nvCxnSpPr>
+          <p:cNvPr id="7" name="Straight Connector 6"/>
+          <p:cNvCxnSpPr/>
+          <p:nvPr/>
+        </p:nvCxnSpPr>
+        <p:spPr>
+          <a:xfrm>
+            <a:off x="731520" y="4599432"/>
+            <a:ext cx="7848600" cy="1588"/>
+          </a:xfrm>
+          <a:prstGeom prst="line">
+            <a:avLst/>
+          </a:prstGeom>
+          <a:ln w="19050">
+            <a:solidFill>
+              <a:schemeClr val="tx2"/>
+            </a:solidFill>
+          </a:ln>
+        </p:spPr>
+        <p:style>
+          <a:lnRef idx="1">
+            <a:schemeClr val="accent1"/>
+          </a:lnRef>
+          <a:fillRef idx="0">
+            <a:schemeClr val="accent1"/>
+          </a:fillRef>
+          <a:effectRef idx="0">
+            <a:schemeClr val="accent1"/>
+          </a:effectRef>
+          <a:fontRef idx="minor">
+            <a:schemeClr val="tx1"/>
+          </a:fontRef>
+        </p:style>
+      </p:cxnSp>
     </p:spTree>
-    <p:extLst>
-      <p:ext uri="{BB962C8B-B14F-4D97-AF65-F5344CB8AC3E}">
-        <p14:creationId xmlns:p14="http://schemas.microsoft.com/office/powerpoint/2010/main" val="2363958579"/>
-      </p:ext>
-    </p:extLst>
   </p:cSld>
   <p:clrMapOvr>
-    <a:masterClrMapping/>
+    <a:overrideClrMapping bg1="dk1" tx1="lt1" bg2="dk2" tx2="lt2" accent1="accent1" accent2="accent2" accent3="accent3" accent4="accent4" accent5="accent5" accent6="accent6" hlink="hlink" folHlink="folHlink"/>
   </p:clrMapOvr>
 </p:sldLayout>
 </file>
 
 <file path=ppt/slideLayouts/slideLayout4.xml><?xml version="1.0" encoding="utf-8"?>
 <p:sldLayout xmlns:a="http://schemas.openxmlformats.org/drawingml/2006/main" xmlns:r="http://schemas.openxmlformats.org/officeDocument/2006/relationships" xmlns:p="http://schemas.openxmlformats.org/presentationml/2006/main" type="twoObj" preserve="1">
-  <p:cSld name="Two Content">
+  <p:cSld name="Zwei Inhalte">
     <p:spTree>
       <p:nvGrpSpPr>
         <p:cNvPr id="1" name=""/>
@@ -1872,8 +1931,8 @@
           <a:lstStyle/>
           <a:p>
             <a:r>
-              <a:rPr lang="en-US" smtClean="0"/>
-              <a:t>Click to edit Master title style</a:t>
+              <a:rPr lang="de-DE" smtClean="0"/>
+              <a:t>Mastertitelformat bearbeiten</a:t>
             </a:r>
             <a:endParaRPr lang="en-US"/>
           </a:p>
@@ -1891,8 +1950,8 @@
         </p:nvSpPr>
         <p:spPr>
           <a:xfrm>
-            <a:off x="457200" y="1600200"/>
-            <a:ext cx="4038600" cy="4525963"/>
+            <a:off x="457200" y="1673352"/>
+            <a:ext cx="4038600" cy="4718304"/>
           </a:xfrm>
         </p:spPr>
         <p:txBody>
@@ -1929,38 +1988,38 @@
           <a:p>
             <a:pPr lvl="0"/>
             <a:r>
-              <a:rPr lang="en-US" smtClean="0"/>
-              <a:t>Click to edit Master text styles</a:t>
+              <a:rPr lang="de-DE" smtClean="0"/>
+              <a:t>Mastertextformat bearbeiten</a:t>
             </a:r>
           </a:p>
           <a:p>
             <a:pPr lvl="1"/>
             <a:r>
-              <a:rPr lang="en-US" smtClean="0"/>
-              <a:t>Second level</a:t>
+              <a:rPr lang="de-DE" smtClean="0"/>
+              <a:t>Zweite Ebene</a:t>
             </a:r>
           </a:p>
           <a:p>
             <a:pPr lvl="2"/>
             <a:r>
-              <a:rPr lang="en-US" smtClean="0"/>
-              <a:t>Third level</a:t>
+              <a:rPr lang="de-DE" smtClean="0"/>
+              <a:t>Dritte Ebene</a:t>
             </a:r>
           </a:p>
           <a:p>
             <a:pPr lvl="3"/>
             <a:r>
-              <a:rPr lang="en-US" smtClean="0"/>
-              <a:t>Fourth level</a:t>
+              <a:rPr lang="de-DE" smtClean="0"/>
+              <a:t>Vierte Ebene</a:t>
             </a:r>
           </a:p>
           <a:p>
             <a:pPr lvl="4"/>
             <a:r>
-              <a:rPr lang="en-US" smtClean="0"/>
-              <a:t>Fifth level</a:t>
-            </a:r>
-            <a:endParaRPr lang="en-US"/>
+              <a:rPr lang="de-DE" smtClean="0"/>
+              <a:t>Fünfte Ebene</a:t>
+            </a:r>
+            <a:endParaRPr lang="en-US" dirty="0"/>
           </a:p>
         </p:txBody>
       </p:sp>
@@ -1976,8 +2035,8 @@
         </p:nvSpPr>
         <p:spPr>
           <a:xfrm>
-            <a:off x="4648200" y="1600200"/>
-            <a:ext cx="4038600" cy="4525963"/>
+            <a:off x="4648200" y="1673352"/>
+            <a:ext cx="4038600" cy="4718304"/>
           </a:xfrm>
         </p:spPr>
         <p:txBody>
@@ -2014,38 +2073,38 @@
           <a:p>
             <a:pPr lvl="0"/>
             <a:r>
-              <a:rPr lang="en-US" smtClean="0"/>
-              <a:t>Click to edit Master text styles</a:t>
+              <a:rPr lang="de-DE" smtClean="0"/>
+              <a:t>Mastertextformat bearbeiten</a:t>
             </a:r>
           </a:p>
           <a:p>
             <a:pPr lvl="1"/>
             <a:r>
-              <a:rPr lang="en-US" smtClean="0"/>
-              <a:t>Second level</a:t>
+              <a:rPr lang="de-DE" smtClean="0"/>
+              <a:t>Zweite Ebene</a:t>
             </a:r>
           </a:p>
           <a:p>
             <a:pPr lvl="2"/>
             <a:r>
-              <a:rPr lang="en-US" smtClean="0"/>
-              <a:t>Third level</a:t>
+              <a:rPr lang="de-DE" smtClean="0"/>
+              <a:t>Dritte Ebene</a:t>
             </a:r>
           </a:p>
           <a:p>
             <a:pPr lvl="3"/>
             <a:r>
-              <a:rPr lang="en-US" smtClean="0"/>
-              <a:t>Fourth level</a:t>
+              <a:rPr lang="de-DE" smtClean="0"/>
+              <a:t>Vierte Ebene</a:t>
             </a:r>
           </a:p>
           <a:p>
             <a:pPr lvl="4"/>
             <a:r>
-              <a:rPr lang="en-US" smtClean="0"/>
-              <a:t>Fifth level</a:t>
-            </a:r>
-            <a:endParaRPr lang="en-US"/>
+              <a:rPr lang="de-DE" smtClean="0"/>
+              <a:t>Fünfte Ebene</a:t>
+            </a:r>
+            <a:endParaRPr lang="en-US" dirty="0"/>
           </a:p>
         </p:txBody>
       </p:sp>
@@ -2066,7 +2125,7 @@
           <a:p>
             <a:fld id="{A6E1CF3F-0DEA-4407-8E52-E5B22F30EA25}" type="datetimeFigureOut">
               <a:rPr lang="en-US" smtClean="0"/>
-              <a:t>11/17/2014</a:t>
+              <a:t>19.11.14</a:t>
             </a:fld>
             <a:endParaRPr lang="en-US"/>
           </a:p>
@@ -2108,18 +2167,13 @@
           <a:p>
             <a:fld id="{ADB383D6-0BC4-4E7D-BDD7-026B00AED181}" type="slidenum">
               <a:rPr lang="en-US" smtClean="0"/>
-              <a:t>‹#›</a:t>
+              <a:t>‹Nr.›</a:t>
             </a:fld>
             <a:endParaRPr lang="en-US"/>
           </a:p>
         </p:txBody>
       </p:sp>
     </p:spTree>
-    <p:extLst>
-      <p:ext uri="{BB962C8B-B14F-4D97-AF65-F5344CB8AC3E}">
-        <p14:creationId xmlns:p14="http://schemas.microsoft.com/office/powerpoint/2010/main" val="3803812062"/>
-      </p:ext>
-    </p:extLst>
   </p:cSld>
   <p:clrMapOvr>
     <a:masterClrMapping/>
@@ -2129,7 +2183,7 @@
 
 <file path=ppt/slideLayouts/slideLayout5.xml><?xml version="1.0" encoding="utf-8"?>
 <p:sldLayout xmlns:a="http://schemas.openxmlformats.org/drawingml/2006/main" xmlns:r="http://schemas.openxmlformats.org/officeDocument/2006/relationships" xmlns:p="http://schemas.openxmlformats.org/presentationml/2006/main" type="twoTxTwoObj" preserve="1">
-  <p:cSld name="Comparison">
+  <p:cSld name="Vergleich">
     <p:spTree>
       <p:nvGrpSpPr>
         <p:cNvPr id="1" name=""/>
@@ -2164,10 +2218,10 @@
           </a:lstStyle>
           <a:p>
             <a:r>
-              <a:rPr lang="en-US" smtClean="0"/>
-              <a:t>Click to edit Master title style</a:t>
-            </a:r>
-            <a:endParaRPr lang="en-US"/>
+              <a:rPr lang="de-DE" smtClean="0"/>
+              <a:t>Mastertitelformat bearbeiten</a:t>
+            </a:r>
+            <a:endParaRPr lang="en-US" dirty="0"/>
           </a:p>
         </p:txBody>
       </p:sp>
@@ -2183,16 +2237,39 @@
         </p:nvSpPr>
         <p:spPr>
           <a:xfrm>
-            <a:off x="457200" y="1535113"/>
-            <a:ext cx="4040188" cy="639762"/>
+            <a:off x="457200" y="1676400"/>
+            <a:ext cx="3931920" cy="639762"/>
           </a:xfrm>
+          <a:noFill/>
+          <a:ln>
+            <a:noFill/>
+          </a:ln>
+          <a:effectLst/>
         </p:spPr>
+        <p:style>
+          <a:lnRef idx="3">
+            <a:schemeClr val="lt1"/>
+          </a:lnRef>
+          <a:fillRef idx="1">
+            <a:schemeClr val="accent2"/>
+          </a:fillRef>
+          <a:effectRef idx="1">
+            <a:schemeClr val="accent2"/>
+          </a:effectRef>
+          <a:fontRef idx="none"/>
+        </p:style>
         <p:txBody>
-          <a:bodyPr anchor="b"/>
+          <a:bodyPr anchor="ctr">
+            <a:normAutofit/>
+          </a:bodyPr>
           <a:lstStyle>
-            <a:lvl1pPr marL="0" indent="0">
+            <a:lvl1pPr marL="0" indent="0" algn="ctr">
               <a:buNone/>
-              <a:defRPr sz="2400" b="1"/>
+              <a:defRPr sz="2000" b="0">
+                <a:solidFill>
+                  <a:schemeClr val="tx2"/>
+                </a:solidFill>
+              </a:defRPr>
             </a:lvl1pPr>
             <a:lvl2pPr marL="457200" indent="0">
               <a:buNone/>
@@ -2230,8 +2307,8 @@
           <a:p>
             <a:pPr lvl="0"/>
             <a:r>
-              <a:rPr lang="en-US" smtClean="0"/>
-              <a:t>Click to edit Master text styles</a:t>
+              <a:rPr lang="de-DE" smtClean="0"/>
+              <a:t>Mastertextformat bearbeiten</a:t>
             </a:r>
           </a:p>
         </p:txBody>
@@ -2248,8 +2325,8 @@
         </p:nvSpPr>
         <p:spPr>
           <a:xfrm>
-            <a:off x="457200" y="2174875"/>
-            <a:ext cx="4040188" cy="3951288"/>
+            <a:off x="457200" y="2438400"/>
+            <a:ext cx="3931920" cy="3951288"/>
           </a:xfrm>
         </p:spPr>
         <p:txBody>
@@ -2286,38 +2363,38 @@
           <a:p>
             <a:pPr lvl="0"/>
             <a:r>
-              <a:rPr lang="en-US" smtClean="0"/>
-              <a:t>Click to edit Master text styles</a:t>
+              <a:rPr lang="de-DE" smtClean="0"/>
+              <a:t>Mastertextformat bearbeiten</a:t>
             </a:r>
           </a:p>
           <a:p>
             <a:pPr lvl="1"/>
             <a:r>
-              <a:rPr lang="en-US" smtClean="0"/>
-              <a:t>Second level</a:t>
+              <a:rPr lang="de-DE" smtClean="0"/>
+              <a:t>Zweite Ebene</a:t>
             </a:r>
           </a:p>
           <a:p>
             <a:pPr lvl="2"/>
             <a:r>
-              <a:rPr lang="en-US" smtClean="0"/>
-              <a:t>Third level</a:t>
+              <a:rPr lang="de-DE" smtClean="0"/>
+              <a:t>Dritte Ebene</a:t>
             </a:r>
           </a:p>
           <a:p>
             <a:pPr lvl="3"/>
             <a:r>
-              <a:rPr lang="en-US" smtClean="0"/>
-              <a:t>Fourth level</a:t>
+              <a:rPr lang="de-DE" smtClean="0"/>
+              <a:t>Vierte Ebene</a:t>
             </a:r>
           </a:p>
           <a:p>
             <a:pPr lvl="4"/>
             <a:r>
-              <a:rPr lang="en-US" smtClean="0"/>
-              <a:t>Fifth level</a:t>
-            </a:r>
-            <a:endParaRPr lang="en-US"/>
+              <a:rPr lang="de-DE" smtClean="0"/>
+              <a:t>Fünfte Ebene</a:t>
+            </a:r>
+            <a:endParaRPr lang="en-US" dirty="0"/>
           </a:p>
         </p:txBody>
       </p:sp>
@@ -2333,16 +2410,42 @@
         </p:nvSpPr>
         <p:spPr>
           <a:xfrm>
-            <a:off x="4645025" y="1535113"/>
-            <a:ext cx="4041775" cy="639762"/>
+            <a:off x="4754880" y="1676400"/>
+            <a:ext cx="3931920" cy="639762"/>
           </a:xfrm>
+          <a:noFill/>
+          <a:ln>
+            <a:noFill/>
+          </a:ln>
+          <a:effectLst/>
         </p:spPr>
+        <p:style>
+          <a:lnRef idx="3">
+            <a:schemeClr val="lt1"/>
+          </a:lnRef>
+          <a:fillRef idx="1">
+            <a:schemeClr val="accent2"/>
+          </a:fillRef>
+          <a:effectRef idx="1">
+            <a:schemeClr val="accent2"/>
+          </a:effectRef>
+          <a:fontRef idx="none"/>
+        </p:style>
         <p:txBody>
-          <a:bodyPr anchor="b"/>
+          <a:bodyPr anchor="ctr">
+            <a:normAutofit/>
+          </a:bodyPr>
           <a:lstStyle>
-            <a:lvl1pPr marL="0" indent="0">
+            <a:lvl1pPr marL="0" indent="0" algn="ctr">
               <a:buNone/>
-              <a:defRPr sz="2400" b="1"/>
+              <a:defRPr lang="en-US" sz="2000" b="0" kern="1200" dirty="0" smtClean="0">
+                <a:solidFill>
+                  <a:schemeClr val="tx2"/>
+                </a:solidFill>
+                <a:latin typeface="+mn-lt"/>
+                <a:ea typeface="+mn-ea"/>
+                <a:cs typeface="+mn-cs"/>
+              </a:defRPr>
             </a:lvl1pPr>
             <a:lvl2pPr marL="457200" indent="0">
               <a:buNone/>
@@ -2380,8 +2483,8 @@
           <a:p>
             <a:pPr lvl="0"/>
             <a:r>
-              <a:rPr lang="en-US" smtClean="0"/>
-              <a:t>Click to edit Master text styles</a:t>
+              <a:rPr lang="de-DE" smtClean="0"/>
+              <a:t>Mastertextformat bearbeiten</a:t>
             </a:r>
           </a:p>
         </p:txBody>
@@ -2398,8 +2501,8 @@
         </p:nvSpPr>
         <p:spPr>
           <a:xfrm>
-            <a:off x="4645025" y="2174875"/>
-            <a:ext cx="4041775" cy="3951288"/>
+            <a:off x="4754880" y="2438400"/>
+            <a:ext cx="3931920" cy="3951288"/>
           </a:xfrm>
         </p:spPr>
         <p:txBody>
@@ -2436,38 +2539,38 @@
           <a:p>
             <a:pPr lvl="0"/>
             <a:r>
-              <a:rPr lang="en-US" smtClean="0"/>
-              <a:t>Click to edit Master text styles</a:t>
+              <a:rPr lang="de-DE" smtClean="0"/>
+              <a:t>Mastertextformat bearbeiten</a:t>
             </a:r>
           </a:p>
           <a:p>
             <a:pPr lvl="1"/>
             <a:r>
-              <a:rPr lang="en-US" smtClean="0"/>
-              <a:t>Second level</a:t>
+              <a:rPr lang="de-DE" smtClean="0"/>
+              <a:t>Zweite Ebene</a:t>
             </a:r>
           </a:p>
           <a:p>
             <a:pPr lvl="2"/>
             <a:r>
-              <a:rPr lang="en-US" smtClean="0"/>
-              <a:t>Third level</a:t>
+              <a:rPr lang="de-DE" smtClean="0"/>
+              <a:t>Dritte Ebene</a:t>
             </a:r>
           </a:p>
           <a:p>
             <a:pPr lvl="3"/>
             <a:r>
-              <a:rPr lang="en-US" smtClean="0"/>
-              <a:t>Fourth level</a:t>
+              <a:rPr lang="de-DE" smtClean="0"/>
+              <a:t>Vierte Ebene</a:t>
             </a:r>
           </a:p>
           <a:p>
             <a:pPr lvl="4"/>
             <a:r>
-              <a:rPr lang="en-US" smtClean="0"/>
-              <a:t>Fifth level</a:t>
-            </a:r>
-            <a:endParaRPr lang="en-US"/>
+              <a:rPr lang="de-DE" smtClean="0"/>
+              <a:t>Fünfte Ebene</a:t>
+            </a:r>
+            <a:endParaRPr lang="en-US" dirty="0"/>
           </a:p>
         </p:txBody>
       </p:sp>
@@ -2488,7 +2591,7 @@
           <a:p>
             <a:fld id="{A6E1CF3F-0DEA-4407-8E52-E5B22F30EA25}" type="datetimeFigureOut">
               <a:rPr lang="en-US" smtClean="0"/>
-              <a:t>11/17/2014</a:t>
+              <a:t>19.11.14</a:t>
             </a:fld>
             <a:endParaRPr lang="en-US"/>
           </a:p>
@@ -2530,18 +2633,48 @@
           <a:p>
             <a:fld id="{ADB383D6-0BC4-4E7D-BDD7-026B00AED181}" type="slidenum">
               <a:rPr lang="en-US" smtClean="0"/>
-              <a:t>‹#›</a:t>
+              <a:t>‹Nr.›</a:t>
             </a:fld>
             <a:endParaRPr lang="en-US"/>
           </a:p>
         </p:txBody>
       </p:sp>
+      <p:cxnSp>
+        <p:nvCxnSpPr>
+          <p:cNvPr id="11" name="Straight Connector 10"/>
+          <p:cNvCxnSpPr/>
+          <p:nvPr/>
+        </p:nvCxnSpPr>
+        <p:spPr>
+          <a:xfrm rot="5400000">
+            <a:off x="2217817" y="4045823"/>
+            <a:ext cx="4709160" cy="794"/>
+          </a:xfrm>
+          <a:prstGeom prst="line">
+            <a:avLst/>
+          </a:prstGeom>
+          <a:ln w="19050">
+            <a:solidFill>
+              <a:schemeClr val="tx2"/>
+            </a:solidFill>
+          </a:ln>
+        </p:spPr>
+        <p:style>
+          <a:lnRef idx="1">
+            <a:schemeClr val="accent1"/>
+          </a:lnRef>
+          <a:fillRef idx="0">
+            <a:schemeClr val="accent1"/>
+          </a:fillRef>
+          <a:effectRef idx="0">
+            <a:schemeClr val="accent1"/>
+          </a:effectRef>
+          <a:fontRef idx="minor">
+            <a:schemeClr val="tx1"/>
+          </a:fontRef>
+        </p:style>
+      </p:cxnSp>
     </p:spTree>
-    <p:extLst>
-      <p:ext uri="{BB962C8B-B14F-4D97-AF65-F5344CB8AC3E}">
-        <p14:creationId xmlns:p14="http://schemas.microsoft.com/office/powerpoint/2010/main" val="1695552259"/>
-      </p:ext>
-    </p:extLst>
   </p:cSld>
   <p:clrMapOvr>
     <a:masterClrMapping/>
@@ -2551,7 +2684,7 @@
 
 <file path=ppt/slideLayouts/slideLayout6.xml><?xml version="1.0" encoding="utf-8"?>
 <p:sldLayout xmlns:a="http://schemas.openxmlformats.org/drawingml/2006/main" xmlns:r="http://schemas.openxmlformats.org/officeDocument/2006/relationships" xmlns:p="http://schemas.openxmlformats.org/presentationml/2006/main" type="titleOnly" preserve="1">
-  <p:cSld name="Title Only">
+  <p:cSld name="Nur Titel">
     <p:spTree>
       <p:nvGrpSpPr>
         <p:cNvPr id="1" name=""/>
@@ -2582,8 +2715,8 @@
           <a:lstStyle/>
           <a:p>
             <a:r>
-              <a:rPr lang="en-US" smtClean="0"/>
-              <a:t>Click to edit Master title style</a:t>
+              <a:rPr lang="de-DE" smtClean="0"/>
+              <a:t>Mastertitelformat bearbeiten</a:t>
             </a:r>
             <a:endParaRPr lang="en-US"/>
           </a:p>
@@ -2606,7 +2739,7 @@
           <a:p>
             <a:fld id="{A6E1CF3F-0DEA-4407-8E52-E5B22F30EA25}" type="datetimeFigureOut">
               <a:rPr lang="en-US" smtClean="0"/>
-              <a:t>11/17/2014</a:t>
+              <a:t>19.11.14</a:t>
             </a:fld>
             <a:endParaRPr lang="en-US"/>
           </a:p>
@@ -2648,18 +2781,13 @@
           <a:p>
             <a:fld id="{ADB383D6-0BC4-4E7D-BDD7-026B00AED181}" type="slidenum">
               <a:rPr lang="en-US" smtClean="0"/>
-              <a:t>‹#›</a:t>
+              <a:t>‹Nr.›</a:t>
             </a:fld>
             <a:endParaRPr lang="en-US"/>
           </a:p>
         </p:txBody>
       </p:sp>
     </p:spTree>
-    <p:extLst>
-      <p:ext uri="{BB962C8B-B14F-4D97-AF65-F5344CB8AC3E}">
-        <p14:creationId xmlns:p14="http://schemas.microsoft.com/office/powerpoint/2010/main" val="3015293144"/>
-      </p:ext>
-    </p:extLst>
   </p:cSld>
   <p:clrMapOvr>
     <a:masterClrMapping/>
@@ -2669,7 +2797,7 @@
 
 <file path=ppt/slideLayouts/slideLayout7.xml><?xml version="1.0" encoding="utf-8"?>
 <p:sldLayout xmlns:a="http://schemas.openxmlformats.org/drawingml/2006/main" xmlns:r="http://schemas.openxmlformats.org/officeDocument/2006/relationships" xmlns:p="http://schemas.openxmlformats.org/presentationml/2006/main" type="blank" preserve="1">
-  <p:cSld name="Blank">
+  <p:cSld name="Leer">
     <p:spTree>
       <p:nvGrpSpPr>
         <p:cNvPr id="1" name=""/>
@@ -2701,7 +2829,7 @@
           <a:p>
             <a:fld id="{A6E1CF3F-0DEA-4407-8E52-E5B22F30EA25}" type="datetimeFigureOut">
               <a:rPr lang="en-US" smtClean="0"/>
-              <a:t>11/17/2014</a:t>
+              <a:t>19.11.14</a:t>
             </a:fld>
             <a:endParaRPr lang="en-US"/>
           </a:p>
@@ -2743,18 +2871,13 @@
           <a:p>
             <a:fld id="{ADB383D6-0BC4-4E7D-BDD7-026B00AED181}" type="slidenum">
               <a:rPr lang="en-US" smtClean="0"/>
-              <a:t>‹#›</a:t>
+              <a:t>‹Nr.›</a:t>
             </a:fld>
             <a:endParaRPr lang="en-US"/>
           </a:p>
         </p:txBody>
       </p:sp>
     </p:spTree>
-    <p:extLst>
-      <p:ext uri="{BB962C8B-B14F-4D97-AF65-F5344CB8AC3E}">
-        <p14:creationId xmlns:p14="http://schemas.microsoft.com/office/powerpoint/2010/main" val="3553174407"/>
-      </p:ext>
-    </p:extLst>
   </p:cSld>
   <p:clrMapOvr>
     <a:masterClrMapping/>
@@ -2764,7 +2887,7 @@
 
 <file path=ppt/slideLayouts/slideLayout8.xml><?xml version="1.0" encoding="utf-8"?>
 <p:sldLayout xmlns:a="http://schemas.openxmlformats.org/drawingml/2006/main" xmlns:r="http://schemas.openxmlformats.org/officeDocument/2006/relationships" xmlns:p="http://schemas.openxmlformats.org/presentationml/2006/main" type="objTx" preserve="1">
-  <p:cSld name="Content with Caption">
+  <p:cSld name="Inhalt mit Beschriftung">
     <p:spTree>
       <p:nvGrpSpPr>
         <p:cNvPr id="1" name=""/>
@@ -2791,23 +2914,25 @@
         </p:nvSpPr>
         <p:spPr>
           <a:xfrm>
-            <a:off x="457200" y="273050"/>
-            <a:ext cx="3008313" cy="1162050"/>
+            <a:off x="457200" y="792080"/>
+            <a:ext cx="2139696" cy="1261872"/>
           </a:xfrm>
         </p:spPr>
         <p:txBody>
-          <a:bodyPr anchor="b"/>
+          <a:bodyPr anchor="b">
+            <a:noAutofit/>
+          </a:bodyPr>
           <a:lstStyle>
             <a:lvl1pPr algn="l">
-              <a:defRPr sz="2000" b="1"/>
+              <a:defRPr sz="2400" b="0"/>
             </a:lvl1pPr>
           </a:lstStyle>
           <a:p>
             <a:r>
-              <a:rPr lang="en-US" smtClean="0"/>
-              <a:t>Click to edit Master title style</a:t>
-            </a:r>
-            <a:endParaRPr lang="en-US"/>
+              <a:rPr lang="de-DE" smtClean="0"/>
+              <a:t>Mastertitelformat bearbeiten</a:t>
+            </a:r>
+            <a:endParaRPr lang="en-US" dirty="0"/>
           </a:p>
         </p:txBody>
       </p:sp>
@@ -2823,8 +2948,8 @@
         </p:nvSpPr>
         <p:spPr>
           <a:xfrm>
-            <a:off x="3575050" y="273050"/>
-            <a:ext cx="5111750" cy="5853113"/>
+            <a:off x="2971800" y="792080"/>
+            <a:ext cx="5715000" cy="5577840"/>
           </a:xfrm>
         </p:spPr>
         <p:txBody>
@@ -2861,38 +2986,38 @@
           <a:p>
             <a:pPr lvl="0"/>
             <a:r>
-              <a:rPr lang="en-US" smtClean="0"/>
-              <a:t>Click to edit Master text styles</a:t>
+              <a:rPr lang="de-DE" smtClean="0"/>
+              <a:t>Mastertextformat bearbeiten</a:t>
             </a:r>
           </a:p>
           <a:p>
             <a:pPr lvl="1"/>
             <a:r>
-              <a:rPr lang="en-US" smtClean="0"/>
-              <a:t>Second level</a:t>
+              <a:rPr lang="de-DE" smtClean="0"/>
+              <a:t>Zweite Ebene</a:t>
             </a:r>
           </a:p>
           <a:p>
             <a:pPr lvl="2"/>
             <a:r>
-              <a:rPr lang="en-US" smtClean="0"/>
-              <a:t>Third level</a:t>
+              <a:rPr lang="de-DE" smtClean="0"/>
+              <a:t>Dritte Ebene</a:t>
             </a:r>
           </a:p>
           <a:p>
             <a:pPr lvl="3"/>
             <a:r>
-              <a:rPr lang="en-US" smtClean="0"/>
-              <a:t>Fourth level</a:t>
+              <a:rPr lang="de-DE" smtClean="0"/>
+              <a:t>Vierte Ebene</a:t>
             </a:r>
           </a:p>
           <a:p>
             <a:pPr lvl="4"/>
             <a:r>
-              <a:rPr lang="en-US" smtClean="0"/>
-              <a:t>Fifth level</a:t>
-            </a:r>
-            <a:endParaRPr lang="en-US"/>
+              <a:rPr lang="de-DE" smtClean="0"/>
+              <a:t>Fünfte Ebene</a:t>
+            </a:r>
+            <a:endParaRPr lang="en-US" dirty="0"/>
           </a:p>
         </p:txBody>
       </p:sp>
@@ -2908,8 +3033,8 @@
         </p:nvSpPr>
         <p:spPr>
           <a:xfrm>
-            <a:off x="457200" y="1435100"/>
-            <a:ext cx="3008313" cy="4691063"/>
+            <a:off x="457201" y="2130552"/>
+            <a:ext cx="2139696" cy="4243615"/>
           </a:xfrm>
         </p:spPr>
         <p:txBody>
@@ -2955,8 +3080,8 @@
           <a:p>
             <a:pPr lvl="0"/>
             <a:r>
-              <a:rPr lang="en-US" smtClean="0"/>
-              <a:t>Click to edit Master text styles</a:t>
+              <a:rPr lang="de-DE" smtClean="0"/>
+              <a:t>Mastertextformat bearbeiten</a:t>
             </a:r>
           </a:p>
         </p:txBody>
@@ -2978,7 +3103,7 @@
           <a:p>
             <a:fld id="{A6E1CF3F-0DEA-4407-8E52-E5B22F30EA25}" type="datetimeFigureOut">
               <a:rPr lang="en-US" smtClean="0"/>
-              <a:t>11/17/2014</a:t>
+              <a:t>19.11.14</a:t>
             </a:fld>
             <a:endParaRPr lang="en-US"/>
           </a:p>
@@ -3020,18 +3145,48 @@
           <a:p>
             <a:fld id="{ADB383D6-0BC4-4E7D-BDD7-026B00AED181}" type="slidenum">
               <a:rPr lang="en-US" smtClean="0"/>
-              <a:t>‹#›</a:t>
+              <a:t>‹Nr.›</a:t>
             </a:fld>
             <a:endParaRPr lang="en-US"/>
           </a:p>
         </p:txBody>
       </p:sp>
+      <p:cxnSp>
+        <p:nvCxnSpPr>
+          <p:cNvPr id="9" name="Straight Connector 8"/>
+          <p:cNvCxnSpPr/>
+          <p:nvPr/>
+        </p:nvCxnSpPr>
+        <p:spPr>
+          <a:xfrm rot="5400000">
+            <a:off x="-13116" y="3580206"/>
+            <a:ext cx="5577840" cy="1588"/>
+          </a:xfrm>
+          <a:prstGeom prst="line">
+            <a:avLst/>
+          </a:prstGeom>
+          <a:ln w="19050">
+            <a:solidFill>
+              <a:schemeClr val="tx2"/>
+            </a:solidFill>
+          </a:ln>
+        </p:spPr>
+        <p:style>
+          <a:lnRef idx="1">
+            <a:schemeClr val="accent1"/>
+          </a:lnRef>
+          <a:fillRef idx="0">
+            <a:schemeClr val="accent1"/>
+          </a:fillRef>
+          <a:effectRef idx="0">
+            <a:schemeClr val="accent1"/>
+          </a:effectRef>
+          <a:fontRef idx="minor">
+            <a:schemeClr val="tx1"/>
+          </a:fontRef>
+        </p:style>
+      </p:cxnSp>
     </p:spTree>
-    <p:extLst>
-      <p:ext uri="{BB962C8B-B14F-4D97-AF65-F5344CB8AC3E}">
-        <p14:creationId xmlns:p14="http://schemas.microsoft.com/office/powerpoint/2010/main" val="2597163147"/>
-      </p:ext>
-    </p:extLst>
   </p:cSld>
   <p:clrMapOvr>
     <a:masterClrMapping/>
@@ -3041,7 +3196,7 @@
 
 <file path=ppt/slideLayouts/slideLayout9.xml><?xml version="1.0" encoding="utf-8"?>
 <p:sldLayout xmlns:a="http://schemas.openxmlformats.org/drawingml/2006/main" xmlns:r="http://schemas.openxmlformats.org/officeDocument/2006/relationships" xmlns:p="http://schemas.openxmlformats.org/presentationml/2006/main" type="picTx" preserve="1">
-  <p:cSld name="Picture with Caption">
+  <p:cSld name="Bild mit Beschriftung">
     <p:spTree>
       <p:nvGrpSpPr>
         <p:cNvPr id="1" name=""/>
@@ -3068,23 +3223,25 @@
         </p:nvSpPr>
         <p:spPr>
           <a:xfrm>
-            <a:off x="1792288" y="4800600"/>
-            <a:ext cx="5486400" cy="566738"/>
+            <a:off x="457200" y="792480"/>
+            <a:ext cx="2142680" cy="1264920"/>
           </a:xfrm>
         </p:spPr>
         <p:txBody>
-          <a:bodyPr anchor="b"/>
+          <a:bodyPr anchor="b">
+            <a:normAutofit/>
+          </a:bodyPr>
           <a:lstStyle>
             <a:lvl1pPr algn="l">
-              <a:defRPr sz="2000" b="1"/>
+              <a:defRPr sz="2400" b="0"/>
             </a:lvl1pPr>
           </a:lstStyle>
           <a:p>
             <a:r>
-              <a:rPr lang="en-US" smtClean="0"/>
-              <a:t>Click to edit Master title style</a:t>
-            </a:r>
-            <a:endParaRPr lang="en-US"/>
+              <a:rPr lang="de-DE" smtClean="0"/>
+              <a:t>Mastertitelformat bearbeiten</a:t>
+            </a:r>
+            <a:endParaRPr lang="en-US" dirty="0"/>
           </a:p>
         </p:txBody>
       </p:sp>
@@ -3100,9 +3257,25 @@
         </p:nvSpPr>
         <p:spPr>
           <a:xfrm>
-            <a:off x="1792288" y="612775"/>
-            <a:ext cx="5486400" cy="4114800"/>
+            <a:off x="2858610" y="838201"/>
+            <a:ext cx="5904390" cy="5500456"/>
           </a:xfrm>
+          <a:solidFill>
+            <a:schemeClr val="bg2"/>
+          </a:solidFill>
+          <a:ln w="76200">
+            <a:solidFill>
+              <a:srgbClr val="FFFFFF"/>
+            </a:solidFill>
+            <a:miter lim="800000"/>
+          </a:ln>
+          <a:effectLst>
+            <a:outerShdw blurRad="50800" dist="12700" dir="5400000" algn="t" rotWithShape="0">
+              <a:prstClr val="black">
+                <a:alpha val="59000"/>
+              </a:prstClr>
+            </a:outerShdw>
+          </a:effectLst>
         </p:spPr>
         <p:txBody>
           <a:bodyPr/>
@@ -3145,7 +3318,11 @@
             </a:lvl9pPr>
           </a:lstStyle>
           <a:p>
-            <a:endParaRPr lang="en-US"/>
+            <a:r>
+              <a:rPr lang="de-DE" smtClean="0"/>
+              <a:t>Bild auf Platzhalter ziehen oder durch Klicken auf Symbol hinzufügen</a:t>
+            </a:r>
+            <a:endParaRPr lang="en-US" dirty="0"/>
           </a:p>
         </p:txBody>
       </p:sp>
@@ -3161,8 +3338,8 @@
         </p:nvSpPr>
         <p:spPr>
           <a:xfrm>
-            <a:off x="1792288" y="5367338"/>
-            <a:ext cx="5486400" cy="804862"/>
+            <a:off x="457200" y="2133600"/>
+            <a:ext cx="2139696" cy="4242816"/>
           </a:xfrm>
         </p:spPr>
         <p:txBody>
@@ -3208,8 +3385,8 @@
           <a:p>
             <a:pPr lvl="0"/>
             <a:r>
-              <a:rPr lang="en-US" smtClean="0"/>
-              <a:t>Click to edit Master text styles</a:t>
+              <a:rPr lang="de-DE" smtClean="0"/>
+              <a:t>Mastertextformat bearbeiten</a:t>
             </a:r>
           </a:p>
         </p:txBody>
@@ -3231,7 +3408,7 @@
           <a:p>
             <a:fld id="{A6E1CF3F-0DEA-4407-8E52-E5B22F30EA25}" type="datetimeFigureOut">
               <a:rPr lang="en-US" smtClean="0"/>
-              <a:t>11/17/2014</a:t>
+              <a:t>19.11.14</a:t>
             </a:fld>
             <a:endParaRPr lang="en-US"/>
           </a:p>
@@ -3273,18 +3450,13 @@
           <a:p>
             <a:fld id="{ADB383D6-0BC4-4E7D-BDD7-026B00AED181}" type="slidenum">
               <a:rPr lang="en-US" smtClean="0"/>
-              <a:t>‹#›</a:t>
+              <a:t>‹Nr.›</a:t>
             </a:fld>
             <a:endParaRPr lang="en-US"/>
           </a:p>
         </p:txBody>
       </p:sp>
     </p:spTree>
-    <p:extLst>
-      <p:ext uri="{BB962C8B-B14F-4D97-AF65-F5344CB8AC3E}">
-        <p14:creationId xmlns:p14="http://schemas.microsoft.com/office/powerpoint/2010/main" val="2042972704"/>
-      </p:ext>
-    </p:extLst>
   </p:cSld>
   <p:clrMapOvr>
     <a:masterClrMapping/>
@@ -3316,6 +3488,52 @@
       </p:grpSpPr>
       <p:sp>
         <p:nvSpPr>
+          <p:cNvPr id="10" name="Rectangle 9"/>
+          <p:cNvSpPr/>
+          <p:nvPr/>
+        </p:nvSpPr>
+        <p:spPr>
+          <a:xfrm>
+            <a:off x="0" y="220786"/>
+            <a:ext cx="9144000" cy="228600"/>
+          </a:xfrm>
+          <a:prstGeom prst="rect">
+            <a:avLst/>
+          </a:prstGeom>
+          <a:solidFill>
+            <a:srgbClr val="FFFFFF"/>
+          </a:solidFill>
+          <a:ln>
+            <a:noFill/>
+          </a:ln>
+        </p:spPr>
+        <p:style>
+          <a:lnRef idx="2">
+            <a:schemeClr val="accent1">
+              <a:shade val="50000"/>
+            </a:schemeClr>
+          </a:lnRef>
+          <a:fillRef idx="1">
+            <a:schemeClr val="accent1"/>
+          </a:fillRef>
+          <a:effectRef idx="0">
+            <a:schemeClr val="accent1"/>
+          </a:effectRef>
+          <a:fontRef idx="minor">
+            <a:schemeClr val="lt1"/>
+          </a:fontRef>
+        </p:style>
+        <p:txBody>
+          <a:bodyPr rtlCol="0" anchor="ctr"/>
+          <a:lstStyle/>
+          <a:p>
+            <a:pPr algn="ctr"/>
+            <a:endParaRPr lang="en-US"/>
+          </a:p>
+        </p:txBody>
+      </p:sp>
+      <p:sp>
+        <p:nvSpPr>
           <p:cNvPr id="2" name="Title Placeholder 1"/>
           <p:cNvSpPr>
             <a:spLocks noGrp="1"/>
@@ -3326,8 +3544,8 @@
         </p:nvSpPr>
         <p:spPr>
           <a:xfrm>
-            <a:off x="457200" y="274638"/>
-            <a:ext cx="8229600" cy="1143000"/>
+            <a:off x="457200" y="533400"/>
+            <a:ext cx="8229600" cy="990600"/>
           </a:xfrm>
           <a:prstGeom prst="rect">
             <a:avLst/>
@@ -3340,10 +3558,10 @@
           <a:lstStyle/>
           <a:p>
             <a:r>
-              <a:rPr lang="en-US" smtClean="0"/>
-              <a:t>Click to edit Master title style</a:t>
-            </a:r>
-            <a:endParaRPr lang="en-US"/>
+              <a:rPr lang="de-DE" smtClean="0"/>
+              <a:t>Mastertitelformat bearbeiten</a:t>
+            </a:r>
+            <a:endParaRPr lang="en-US" dirty="0"/>
           </a:p>
         </p:txBody>
       </p:sp>
@@ -3360,7 +3578,7 @@
         <p:spPr>
           <a:xfrm>
             <a:off x="457200" y="1600200"/>
-            <a:ext cx="8229600" cy="4525963"/>
+            <a:ext cx="8229600" cy="4876800"/>
           </a:xfrm>
           <a:prstGeom prst="rect">
             <a:avLst/>
@@ -3374,37 +3592,83 @@
           <a:p>
             <a:pPr lvl="0"/>
             <a:r>
-              <a:rPr lang="en-US" smtClean="0"/>
-              <a:t>Click to edit Master text styles</a:t>
+              <a:rPr lang="de-DE" smtClean="0"/>
+              <a:t>Mastertextformat bearbeiten</a:t>
             </a:r>
           </a:p>
           <a:p>
             <a:pPr lvl="1"/>
             <a:r>
-              <a:rPr lang="en-US" smtClean="0"/>
-              <a:t>Second level</a:t>
+              <a:rPr lang="de-DE" smtClean="0"/>
+              <a:t>Zweite Ebene</a:t>
             </a:r>
           </a:p>
           <a:p>
             <a:pPr lvl="2"/>
             <a:r>
-              <a:rPr lang="en-US" smtClean="0"/>
-              <a:t>Third level</a:t>
+              <a:rPr lang="de-DE" smtClean="0"/>
+              <a:t>Dritte Ebene</a:t>
             </a:r>
           </a:p>
           <a:p>
             <a:pPr lvl="3"/>
             <a:r>
-              <a:rPr lang="en-US" smtClean="0"/>
-              <a:t>Fourth level</a:t>
+              <a:rPr lang="de-DE" smtClean="0"/>
+              <a:t>Vierte Ebene</a:t>
             </a:r>
           </a:p>
           <a:p>
             <a:pPr lvl="4"/>
             <a:r>
-              <a:rPr lang="en-US" smtClean="0"/>
-              <a:t>Fifth level</a:t>
-            </a:r>
+              <a:rPr lang="de-DE" smtClean="0"/>
+              <a:t>Fünfte Ebene</a:t>
+            </a:r>
+            <a:endParaRPr lang="en-US" dirty="0"/>
+          </a:p>
+        </p:txBody>
+      </p:sp>
+      <p:sp>
+        <p:nvSpPr>
+          <p:cNvPr id="7" name="Rectangle 6"/>
+          <p:cNvSpPr/>
+          <p:nvPr/>
+        </p:nvSpPr>
+        <p:spPr>
+          <a:xfrm>
+            <a:off x="0" y="0"/>
+            <a:ext cx="9144000" cy="365760"/>
+          </a:xfrm>
+          <a:prstGeom prst="rect">
+            <a:avLst/>
+          </a:prstGeom>
+          <a:solidFill>
+            <a:schemeClr val="accent1"/>
+          </a:solidFill>
+          <a:ln>
+            <a:noFill/>
+          </a:ln>
+        </p:spPr>
+        <p:style>
+          <a:lnRef idx="2">
+            <a:schemeClr val="accent1">
+              <a:shade val="50000"/>
+            </a:schemeClr>
+          </a:lnRef>
+          <a:fillRef idx="1">
+            <a:schemeClr val="accent1"/>
+          </a:fillRef>
+          <a:effectRef idx="0">
+            <a:schemeClr val="accent1"/>
+          </a:effectRef>
+          <a:fontRef idx="minor">
+            <a:schemeClr val="lt1"/>
+          </a:fontRef>
+        </p:style>
+        <p:txBody>
+          <a:bodyPr rtlCol="0" anchor="ctr"/>
+          <a:lstStyle/>
+          <a:p>
+            <a:pPr algn="ctr"/>
             <a:endParaRPr lang="en-US"/>
           </a:p>
         </p:txBody>
@@ -3421,8 +3685,8 @@
         </p:nvSpPr>
         <p:spPr>
           <a:xfrm>
-            <a:off x="457200" y="6356350"/>
-            <a:ext cx="2133600" cy="365125"/>
+            <a:off x="457200" y="18288"/>
+            <a:ext cx="2895600" cy="329184"/>
           </a:xfrm>
           <a:prstGeom prst="rect">
             <a:avLst/>
@@ -3434,9 +3698,7 @@
             <a:lvl1pPr algn="l">
               <a:defRPr sz="1200">
                 <a:solidFill>
-                  <a:schemeClr val="tx1">
-                    <a:tint val="75000"/>
-                  </a:schemeClr>
+                  <a:srgbClr val="FFFFFF"/>
                 </a:solidFill>
               </a:defRPr>
             </a:lvl1pPr>
@@ -3444,7 +3706,7 @@
           <a:p>
             <a:fld id="{A6E1CF3F-0DEA-4407-8E52-E5B22F30EA25}" type="datetimeFigureOut">
               <a:rPr lang="en-US" smtClean="0"/>
-              <a:t>11/17/2014</a:t>
+              <a:t>19.11.14</a:t>
             </a:fld>
             <a:endParaRPr lang="en-US"/>
           </a:p>
@@ -3462,8 +3724,8 @@
         </p:nvSpPr>
         <p:spPr>
           <a:xfrm>
-            <a:off x="3124200" y="6356350"/>
-            <a:ext cx="2895600" cy="365125"/>
+            <a:off x="3429000" y="18288"/>
+            <a:ext cx="4114800" cy="329184"/>
           </a:xfrm>
           <a:prstGeom prst="rect">
             <a:avLst/>
@@ -3475,9 +3737,7 @@
             <a:lvl1pPr algn="ctr">
               <a:defRPr sz="1200">
                 <a:solidFill>
-                  <a:schemeClr val="tx1">
-                    <a:tint val="75000"/>
-                  </a:schemeClr>
+                  <a:srgbClr val="FFFFFF"/>
                 </a:solidFill>
               </a:defRPr>
             </a:lvl1pPr>
@@ -3499,8 +3759,8 @@
         </p:nvSpPr>
         <p:spPr>
           <a:xfrm>
-            <a:off x="6553200" y="6356350"/>
-            <a:ext cx="2133600" cy="365125"/>
+            <a:off x="7620000" y="18288"/>
+            <a:ext cx="1066800" cy="329184"/>
           </a:xfrm>
           <a:prstGeom prst="rect">
             <a:avLst/>
@@ -3509,12 +3769,10 @@
         <p:txBody>
           <a:bodyPr vert="horz" lIns="91440" tIns="45720" rIns="91440" bIns="45720" rtlCol="0" anchor="ctr"/>
           <a:lstStyle>
-            <a:lvl1pPr algn="r">
-              <a:defRPr sz="1200">
+            <a:lvl1pPr algn="l">
+              <a:defRPr sz="1400" b="1">
                 <a:solidFill>
-                  <a:schemeClr val="tx1">
-                    <a:tint val="75000"/>
-                  </a:schemeClr>
+                  <a:srgbClr val="FFFFFF"/>
                 </a:solidFill>
               </a:defRPr>
             </a:lvl1pPr>
@@ -3522,43 +3780,38 @@
           <a:p>
             <a:fld id="{ADB383D6-0BC4-4E7D-BDD7-026B00AED181}" type="slidenum">
               <a:rPr lang="en-US" smtClean="0"/>
-              <a:t>‹#›</a:t>
+              <a:t>‹Nr.›</a:t>
             </a:fld>
             <a:endParaRPr lang="en-US"/>
           </a:p>
         </p:txBody>
       </p:sp>
     </p:spTree>
-    <p:extLst>
-      <p:ext uri="{BB962C8B-B14F-4D97-AF65-F5344CB8AC3E}">
-        <p14:creationId xmlns:p14="http://schemas.microsoft.com/office/powerpoint/2010/main" val="1780905398"/>
-      </p:ext>
-    </p:extLst>
   </p:cSld>
   <p:clrMap bg1="lt1" tx1="dk1" bg2="lt2" tx2="dk2" accent1="accent1" accent2="accent2" accent3="accent3" accent4="accent4" accent5="accent5" accent6="accent6" hlink="hlink" folHlink="folHlink"/>
   <p:sldLayoutIdLst>
-    <p:sldLayoutId id="2147483697" r:id="rId1"/>
-    <p:sldLayoutId id="2147483698" r:id="rId2"/>
-    <p:sldLayoutId id="2147483699" r:id="rId3"/>
-    <p:sldLayoutId id="2147483700" r:id="rId4"/>
-    <p:sldLayoutId id="2147483701" r:id="rId5"/>
-    <p:sldLayoutId id="2147483702" r:id="rId6"/>
-    <p:sldLayoutId id="2147483703" r:id="rId7"/>
-    <p:sldLayoutId id="2147483704" r:id="rId8"/>
-    <p:sldLayoutId id="2147483705" r:id="rId9"/>
-    <p:sldLayoutId id="2147483706" r:id="rId10"/>
-    <p:sldLayoutId id="2147483707" r:id="rId11"/>
+    <p:sldLayoutId id="2147483738" r:id="rId1"/>
+    <p:sldLayoutId id="2147483739" r:id="rId2"/>
+    <p:sldLayoutId id="2147483740" r:id="rId3"/>
+    <p:sldLayoutId id="2147483741" r:id="rId4"/>
+    <p:sldLayoutId id="2147483742" r:id="rId5"/>
+    <p:sldLayoutId id="2147483743" r:id="rId6"/>
+    <p:sldLayoutId id="2147483744" r:id="rId7"/>
+    <p:sldLayoutId id="2147483745" r:id="rId8"/>
+    <p:sldLayoutId id="2147483746" r:id="rId9"/>
+    <p:sldLayoutId id="2147483747" r:id="rId10"/>
+    <p:sldLayoutId id="2147483748" r:id="rId11"/>
   </p:sldLayoutIdLst>
   <p:txStyles>
     <p:titleStyle>
-      <a:lvl1pPr algn="ctr" defTabSz="914400" rtl="0" eaLnBrk="1" latinLnBrk="0" hangingPunct="1">
+      <a:lvl1pPr algn="l" defTabSz="914400" rtl="0" eaLnBrk="1" latinLnBrk="0" hangingPunct="1">
         <a:spcBef>
           <a:spcPct val="0"/>
         </a:spcBef>
         <a:buNone/>
-        <a:defRPr sz="4400" kern="1200">
+        <a:defRPr sz="4000" kern="1200" spc="-100" baseline="0">
           <a:solidFill>
-            <a:schemeClr val="tx1"/>
+            <a:schemeClr val="tx2"/>
           </a:solidFill>
           <a:latin typeface="+mj-lt"/>
           <a:ea typeface="+mj-ea"/>
@@ -3567,41 +3820,15 @@
       </a:lvl1pPr>
     </p:titleStyle>
     <p:bodyStyle>
-      <a:lvl1pPr marL="342900" indent="-342900" algn="l" defTabSz="914400" rtl="0" eaLnBrk="1" latinLnBrk="0" hangingPunct="1">
+      <a:lvl1pPr marL="182880" indent="-182880" algn="l" defTabSz="914400" rtl="0" eaLnBrk="1" latinLnBrk="0" hangingPunct="1">
         <a:spcBef>
           <a:spcPct val="20000"/>
         </a:spcBef>
-        <a:buFont typeface="Arial" panose="020B0604020202020204" pitchFamily="34" charset="0"/>
-        <a:buChar char="•"/>
-        <a:defRPr sz="3200" kern="1200">
-          <a:solidFill>
-            <a:schemeClr val="tx1"/>
-          </a:solidFill>
-          <a:latin typeface="+mn-lt"/>
-          <a:ea typeface="+mn-ea"/>
-          <a:cs typeface="+mn-cs"/>
-        </a:defRPr>
-      </a:lvl1pPr>
-      <a:lvl2pPr marL="742950" indent="-285750" algn="l" defTabSz="914400" rtl="0" eaLnBrk="1" latinLnBrk="0" hangingPunct="1">
-        <a:spcBef>
-          <a:spcPct val="20000"/>
-        </a:spcBef>
-        <a:buFont typeface="Arial" panose="020B0604020202020204" pitchFamily="34" charset="0"/>
-        <a:buChar char="–"/>
-        <a:defRPr sz="2800" kern="1200">
-          <a:solidFill>
-            <a:schemeClr val="tx1"/>
-          </a:solidFill>
-          <a:latin typeface="+mn-lt"/>
-          <a:ea typeface="+mn-ea"/>
-          <a:cs typeface="+mn-cs"/>
-        </a:defRPr>
-      </a:lvl2pPr>
-      <a:lvl3pPr marL="1143000" indent="-228600" algn="l" defTabSz="914400" rtl="0" eaLnBrk="1" latinLnBrk="0" hangingPunct="1">
-        <a:spcBef>
-          <a:spcPct val="20000"/>
-        </a:spcBef>
-        <a:buFont typeface="Arial" panose="020B0604020202020204" pitchFamily="34" charset="0"/>
+        <a:buClr>
+          <a:schemeClr val="accent1"/>
+        </a:buClr>
+        <a:buSzPct val="85000"/>
+        <a:buFont typeface="Arial" pitchFamily="34" charset="0"/>
         <a:buChar char="•"/>
         <a:defRPr sz="2400" kern="1200">
           <a:solidFill>
@@ -3611,42 +3838,16 @@
           <a:ea typeface="+mn-ea"/>
           <a:cs typeface="+mn-cs"/>
         </a:defRPr>
-      </a:lvl3pPr>
-      <a:lvl4pPr marL="1600200" indent="-228600" algn="l" defTabSz="914400" rtl="0" eaLnBrk="1" latinLnBrk="0" hangingPunct="1">
+      </a:lvl1pPr>
+      <a:lvl2pPr marL="457200" indent="-182880" algn="l" defTabSz="914400" rtl="0" eaLnBrk="1" latinLnBrk="0" hangingPunct="1">
         <a:spcBef>
           <a:spcPct val="20000"/>
         </a:spcBef>
-        <a:buFont typeface="Arial" panose="020B0604020202020204" pitchFamily="34" charset="0"/>
-        <a:buChar char="–"/>
-        <a:defRPr sz="2000" kern="1200">
-          <a:solidFill>
-            <a:schemeClr val="tx1"/>
-          </a:solidFill>
-          <a:latin typeface="+mn-lt"/>
-          <a:ea typeface="+mn-ea"/>
-          <a:cs typeface="+mn-cs"/>
-        </a:defRPr>
-      </a:lvl4pPr>
-      <a:lvl5pPr marL="2057400" indent="-228600" algn="l" defTabSz="914400" rtl="0" eaLnBrk="1" latinLnBrk="0" hangingPunct="1">
-        <a:spcBef>
-          <a:spcPct val="20000"/>
-        </a:spcBef>
-        <a:buFont typeface="Arial" panose="020B0604020202020204" pitchFamily="34" charset="0"/>
-        <a:buChar char="»"/>
-        <a:defRPr sz="2000" kern="1200">
-          <a:solidFill>
-            <a:schemeClr val="tx1"/>
-          </a:solidFill>
-          <a:latin typeface="+mn-lt"/>
-          <a:ea typeface="+mn-ea"/>
-          <a:cs typeface="+mn-cs"/>
-        </a:defRPr>
-      </a:lvl5pPr>
-      <a:lvl6pPr marL="2514600" indent="-228600" algn="l" defTabSz="914400" rtl="0" eaLnBrk="1" latinLnBrk="0" hangingPunct="1">
-        <a:spcBef>
-          <a:spcPct val="20000"/>
-        </a:spcBef>
-        <a:buFont typeface="Arial" panose="020B0604020202020204" pitchFamily="34" charset="0"/>
+        <a:buClr>
+          <a:schemeClr val="accent1"/>
+        </a:buClr>
+        <a:buSzPct val="85000"/>
+        <a:buFont typeface="Arial" pitchFamily="34" charset="0"/>
         <a:buChar char="•"/>
         <a:defRPr sz="2000" kern="1200">
           <a:solidFill>
@@ -3656,14 +3857,91 @@
           <a:ea typeface="+mn-ea"/>
           <a:cs typeface="+mn-cs"/>
         </a:defRPr>
-      </a:lvl6pPr>
-      <a:lvl7pPr marL="2971800" indent="-228600" algn="l" defTabSz="914400" rtl="0" eaLnBrk="1" latinLnBrk="0" hangingPunct="1">
+      </a:lvl2pPr>
+      <a:lvl3pPr marL="731520" indent="-182880" algn="l" defTabSz="914400" rtl="0" eaLnBrk="1" latinLnBrk="0" hangingPunct="1">
         <a:spcBef>
           <a:spcPct val="20000"/>
         </a:spcBef>
-        <a:buFont typeface="Arial" panose="020B0604020202020204" pitchFamily="34" charset="0"/>
+        <a:buClr>
+          <a:schemeClr val="accent1"/>
+        </a:buClr>
+        <a:buSzPct val="90000"/>
+        <a:buFont typeface="Arial" pitchFamily="34" charset="0"/>
         <a:buChar char="•"/>
-        <a:defRPr sz="2000" kern="1200">
+        <a:defRPr sz="1800" kern="1200">
+          <a:solidFill>
+            <a:schemeClr val="tx1"/>
+          </a:solidFill>
+          <a:latin typeface="+mn-lt"/>
+          <a:ea typeface="+mn-ea"/>
+          <a:cs typeface="+mn-cs"/>
+        </a:defRPr>
+      </a:lvl3pPr>
+      <a:lvl4pPr marL="1005840" indent="-182880" algn="l" defTabSz="914400" rtl="0" eaLnBrk="1" latinLnBrk="0" hangingPunct="1">
+        <a:spcBef>
+          <a:spcPct val="20000"/>
+        </a:spcBef>
+        <a:buClr>
+          <a:schemeClr val="accent1"/>
+        </a:buClr>
+        <a:buFont typeface="Arial" pitchFamily="34" charset="0"/>
+        <a:buChar char="•"/>
+        <a:defRPr sz="1600" kern="1200">
+          <a:solidFill>
+            <a:schemeClr val="tx1"/>
+          </a:solidFill>
+          <a:latin typeface="+mn-lt"/>
+          <a:ea typeface="+mn-ea"/>
+          <a:cs typeface="+mn-cs"/>
+        </a:defRPr>
+      </a:lvl4pPr>
+      <a:lvl5pPr marL="1188720" indent="-137160" algn="l" defTabSz="914400" rtl="0" eaLnBrk="1" latinLnBrk="0" hangingPunct="1">
+        <a:spcBef>
+          <a:spcPct val="20000"/>
+        </a:spcBef>
+        <a:buClr>
+          <a:schemeClr val="accent1"/>
+        </a:buClr>
+        <a:buSzPct val="100000"/>
+        <a:buFont typeface="Arial" pitchFamily="34" charset="0"/>
+        <a:buChar char="•"/>
+        <a:defRPr sz="1400" kern="1200" baseline="0">
+          <a:solidFill>
+            <a:schemeClr val="tx1"/>
+          </a:solidFill>
+          <a:latin typeface="+mn-lt"/>
+          <a:ea typeface="+mn-ea"/>
+          <a:cs typeface="+mn-cs"/>
+        </a:defRPr>
+      </a:lvl5pPr>
+      <a:lvl6pPr marL="1371600" indent="-182880" algn="l" defTabSz="914400" rtl="0" eaLnBrk="1" latinLnBrk="0" hangingPunct="1">
+        <a:spcBef>
+          <a:spcPct val="20000"/>
+        </a:spcBef>
+        <a:buClr>
+          <a:schemeClr val="accent1"/>
+        </a:buClr>
+        <a:buFont typeface="Arial" pitchFamily="34" charset="0"/>
+        <a:buChar char="•"/>
+        <a:defRPr sz="1300" kern="1200">
+          <a:solidFill>
+            <a:schemeClr val="tx1"/>
+          </a:solidFill>
+          <a:latin typeface="+mn-lt"/>
+          <a:ea typeface="+mn-ea"/>
+          <a:cs typeface="+mn-cs"/>
+        </a:defRPr>
+      </a:lvl6pPr>
+      <a:lvl7pPr marL="1554480" indent="-182880" algn="l" defTabSz="914400" rtl="0" eaLnBrk="1" latinLnBrk="0" hangingPunct="1">
+        <a:spcBef>
+          <a:spcPct val="20000"/>
+        </a:spcBef>
+        <a:buClr>
+          <a:schemeClr val="accent1"/>
+        </a:buClr>
+        <a:buFont typeface="Arial" pitchFamily="34" charset="0"/>
+        <a:buChar char="•"/>
+        <a:defRPr sz="1300" kern="1200">
           <a:solidFill>
             <a:schemeClr val="tx1"/>
           </a:solidFill>
@@ -3672,13 +3950,16 @@
           <a:cs typeface="+mn-cs"/>
         </a:defRPr>
       </a:lvl7pPr>
-      <a:lvl8pPr marL="3429000" indent="-228600" algn="l" defTabSz="914400" rtl="0" eaLnBrk="1" latinLnBrk="0" hangingPunct="1">
+      <a:lvl8pPr marL="1737360" indent="-182880" algn="l" defTabSz="914400" rtl="0" eaLnBrk="1" latinLnBrk="0" hangingPunct="1">
         <a:spcBef>
           <a:spcPct val="20000"/>
         </a:spcBef>
-        <a:buFont typeface="Arial" panose="020B0604020202020204" pitchFamily="34" charset="0"/>
+        <a:buClr>
+          <a:schemeClr val="accent1"/>
+        </a:buClr>
+        <a:buFont typeface="Arial" pitchFamily="34" charset="0"/>
         <a:buChar char="•"/>
-        <a:defRPr sz="2000" kern="1200">
+        <a:defRPr sz="1300" kern="1200">
           <a:solidFill>
             <a:schemeClr val="tx1"/>
           </a:solidFill>
@@ -3687,13 +3968,16 @@
           <a:cs typeface="+mn-cs"/>
         </a:defRPr>
       </a:lvl8pPr>
-      <a:lvl9pPr marL="3886200" indent="-228600" algn="l" defTabSz="914400" rtl="0" eaLnBrk="1" latinLnBrk="0" hangingPunct="1">
+      <a:lvl9pPr marL="1920240" indent="-182880" algn="l" defTabSz="914400" rtl="0" eaLnBrk="1" latinLnBrk="0" hangingPunct="1">
         <a:spcBef>
           <a:spcPct val="20000"/>
         </a:spcBef>
-        <a:buFont typeface="Arial" panose="020B0604020202020204" pitchFamily="34" charset="0"/>
+        <a:buClr>
+          <a:schemeClr val="accent1"/>
+        </a:buClr>
+        <a:buFont typeface="Arial" pitchFamily="34" charset="0"/>
         <a:buChar char="•"/>
-        <a:defRPr sz="2000" kern="1200">
+        <a:defRPr sz="1300" kern="1200">
           <a:solidFill>
             <a:schemeClr val="tx1"/>
           </a:solidFill>
@@ -3894,7 +4178,7 @@
   <p:timing>
     <p:tnLst>
       <p:par>
-        <p:cTn id="1" dur="indefinite" restart="never" nodeType="tmRoot"/>
+        <p:cTn xmlns:p14="http://schemas.microsoft.com/office/powerpoint/2010/main" id="1" dur="indefinite" restart="never" nodeType="tmRoot"/>
       </p:par>
     </p:tnLst>
   </p:timing>
@@ -3957,7 +4241,7 @@
         </p:nvGraphicFramePr>
         <p:xfrm>
           <a:off x="2580986" y="1524766"/>
-          <a:ext cx="3982027" cy="4676831"/>
+          <a:ext cx="3982027" cy="5281796"/>
         </p:xfrm>
         <a:graphic>
           <a:graphicData uri="http://schemas.openxmlformats.org/drawingml/2006/table">
@@ -6971,7 +7255,7 @@
   <p:timing>
     <p:tnLst>
       <p:par>
-        <p:cTn id="1" dur="indefinite" restart="never" nodeType="tmRoot"/>
+        <p:cTn xmlns:p14="http://schemas.microsoft.com/office/powerpoint/2010/main" id="1" dur="indefinite" restart="never" nodeType="tmRoot"/>
       </p:par>
     </p:tnLst>
   </p:timing>
@@ -7038,7 +7322,7 @@
         </p:nvGraphicFramePr>
         <p:xfrm>
           <a:off x="1475656" y="1700808"/>
-          <a:ext cx="6096000" cy="2763520"/>
+          <a:ext cx="6096000" cy="3307079"/>
         </p:xfrm>
         <a:graphic>
           <a:graphicData uri="http://schemas.openxmlformats.org/drawingml/2006/table">
@@ -7372,7 +7656,7 @@
   <p:timing>
     <p:tnLst>
       <p:par>
-        <p:cTn id="1" dur="indefinite" restart="never" nodeType="tmRoot"/>
+        <p:cTn xmlns:p14="http://schemas.microsoft.com/office/powerpoint/2010/main" id="1" dur="indefinite" restart="never" nodeType="tmRoot"/>
       </p:par>
     </p:tnLst>
   </p:timing>
@@ -7432,7 +7716,7 @@
   <p:timing>
     <p:tnLst>
       <p:par>
-        <p:cTn id="1" dur="indefinite" restart="never" nodeType="tmRoot"/>
+        <p:cTn xmlns:p14="http://schemas.microsoft.com/office/powerpoint/2010/main" id="1" dur="indefinite" restart="never" nodeType="tmRoot"/>
       </p:par>
     </p:tnLst>
   </p:timing>
@@ -7492,7 +7776,7 @@
         <p:spPr/>
         <p:txBody>
           <a:bodyPr>
-            <a:normAutofit fontScale="92500" lnSpcReduction="10000"/>
+            <a:normAutofit/>
           </a:bodyPr>
           <a:lstStyle/>
           <a:p>
@@ -7500,46 +7784,38 @@
               <a:buAutoNum type="arabicPeriod"/>
             </a:pPr>
             <a:r>
-              <a:rPr lang="de-DE" sz="2400" dirty="0" smtClean="0"/>
+              <a:rPr lang="de-DE" sz="2800" dirty="0" smtClean="0"/>
               <a:t>Einleitung</a:t>
             </a:r>
-            <a:endParaRPr lang="de-DE" sz="2000" dirty="0"/>
-          </a:p>
-          <a:p>
-            <a:pPr marL="0" indent="0">
-              <a:buNone/>
-            </a:pPr>
-            <a:r>
-              <a:rPr lang="de-DE" sz="2000" dirty="0"/>
-              <a:t>	</a:t>
-            </a:r>
-            <a:r>
-              <a:rPr lang="de-DE" sz="2000" dirty="0" smtClean="0"/>
-              <a:t>=&gt; Gesamtübersicht</a:t>
-            </a:r>
-          </a:p>
-          <a:p>
-            <a:pPr marL="0" indent="0">
-              <a:buNone/>
-            </a:pPr>
-            <a:r>
-              <a:rPr lang="de-DE" sz="2000" dirty="0"/>
-              <a:t>	</a:t>
-            </a:r>
-            <a:r>
-              <a:rPr lang="de-DE" sz="2000" dirty="0" smtClean="0"/>
-              <a:t>=&gt; </a:t>
-            </a:r>
-            <a:r>
-              <a:rPr lang="de-DE" sz="2000" smtClean="0"/>
-              <a:t>unsere Teilaufgabe</a:t>
-            </a:r>
-          </a:p>
-          <a:p>
-            <a:pPr marL="0" indent="0">
-              <a:buNone/>
-            </a:pPr>
-            <a:endParaRPr lang="de-DE" sz="2400" dirty="0" smtClean="0"/>
+            <a:endParaRPr lang="de-DE" sz="2800" dirty="0"/>
+          </a:p>
+          <a:p>
+            <a:pPr lvl="1"/>
+            <a:r>
+              <a:rPr lang="de-DE" dirty="0" smtClean="0"/>
+              <a:t> </a:t>
+            </a:r>
+            <a:r>
+              <a:rPr lang="de-DE" dirty="0" smtClean="0"/>
+              <a:t>Gesamtübersicht</a:t>
+            </a:r>
+            <a:endParaRPr lang="de-DE" dirty="0" smtClean="0"/>
+          </a:p>
+          <a:p>
+            <a:pPr lvl="1"/>
+            <a:r>
+              <a:rPr lang="de-DE" dirty="0" smtClean="0"/>
+              <a:t> </a:t>
+            </a:r>
+            <a:r>
+              <a:rPr lang="de-DE" dirty="0"/>
+              <a:t>u</a:t>
+            </a:r>
+            <a:r>
+              <a:rPr lang="de-DE" dirty="0" smtClean="0"/>
+              <a:t>nsere Teilaufgabe</a:t>
+            </a:r>
+            <a:endParaRPr lang="de-DE" dirty="0" smtClean="0"/>
           </a:p>
           <a:p>
             <a:pPr marL="457200" indent="-457200">
@@ -7547,49 +7823,39 @@
             </a:pPr>
             <a:r>
               <a:rPr lang="de-DE" sz="2400" dirty="0" smtClean="0"/>
-              <a:t> Unsere Ideen</a:t>
-            </a:r>
-          </a:p>
-          <a:p>
-            <a:pPr marL="0" indent="0">
-              <a:buNone/>
-            </a:pPr>
-            <a:r>
-              <a:rPr lang="de-DE" sz="2000" dirty="0" smtClean="0"/>
-              <a:t>	=&gt; Hard- u. Software</a:t>
-            </a:r>
-          </a:p>
-          <a:p>
-            <a:pPr marL="0" indent="0">
-              <a:buNone/>
-            </a:pPr>
-            <a:r>
-              <a:rPr lang="de-DE" sz="2000" dirty="0"/>
-              <a:t>	</a:t>
-            </a:r>
-            <a:r>
-              <a:rPr lang="de-DE" sz="2000" dirty="0" smtClean="0"/>
-              <a:t>=&gt; Umgebung</a:t>
-            </a:r>
-          </a:p>
-          <a:p>
-            <a:pPr marL="0" indent="0">
-              <a:buNone/>
-            </a:pPr>
-            <a:r>
-              <a:rPr lang="de-DE" sz="2000" dirty="0"/>
-              <a:t>	</a:t>
-            </a:r>
-            <a:r>
-              <a:rPr lang="de-DE" sz="2000" dirty="0" smtClean="0"/>
-              <a:t>=&gt; Fokussierte Punkte</a:t>
-            </a:r>
-          </a:p>
-          <a:p>
-            <a:pPr marL="0" indent="0">
-              <a:buNone/>
-            </a:pPr>
-            <a:endParaRPr lang="de-DE" sz="2000" dirty="0"/>
+              <a:t> </a:t>
+            </a:r>
+            <a:r>
+              <a:rPr lang="de-DE" sz="2800" dirty="0" smtClean="0"/>
+              <a:t>Unsere Ideen</a:t>
+            </a:r>
+          </a:p>
+          <a:p>
+            <a:pPr lvl="1"/>
+            <a:r>
+              <a:rPr lang="de-DE" dirty="0" smtClean="0"/>
+              <a:t>Hard</a:t>
+            </a:r>
+            <a:r>
+              <a:rPr lang="de-DE" dirty="0" smtClean="0"/>
+              <a:t>- u. Software</a:t>
+            </a:r>
+          </a:p>
+          <a:p>
+            <a:pPr lvl="1"/>
+            <a:r>
+              <a:rPr lang="de-DE" dirty="0" smtClean="0"/>
+              <a:t>Umgebung</a:t>
+            </a:r>
+            <a:endParaRPr lang="de-DE" dirty="0" smtClean="0"/>
+          </a:p>
+          <a:p>
+            <a:pPr lvl="1"/>
+            <a:r>
+              <a:rPr lang="de-DE" dirty="0" smtClean="0"/>
+              <a:t>Fokussierte Punkte</a:t>
+            </a:r>
+            <a:endParaRPr lang="de-DE" dirty="0"/>
           </a:p>
           <a:p>
             <a:pPr marL="457200" indent="-457200">
@@ -7597,48 +7863,36 @@
             </a:pPr>
             <a:r>
               <a:rPr lang="de-DE" sz="2400" dirty="0" smtClean="0"/>
-              <a:t> Prototyp</a:t>
-            </a:r>
-          </a:p>
-          <a:p>
-            <a:pPr marL="0" indent="0">
-              <a:buNone/>
-            </a:pPr>
-            <a:r>
-              <a:rPr lang="de-DE" sz="2000" dirty="0"/>
               <a:t> </a:t>
             </a:r>
             <a:r>
-              <a:rPr lang="de-DE" sz="2000" dirty="0" smtClean="0"/>
-              <a:t>	=&gt; Vorstellung</a:t>
-            </a:r>
-          </a:p>
-          <a:p>
-            <a:pPr marL="0" indent="0">
-              <a:buNone/>
-            </a:pPr>
-            <a:r>
-              <a:rPr lang="de-DE" sz="2000" dirty="0"/>
-              <a:t>	</a:t>
-            </a:r>
-            <a:r>
-              <a:rPr lang="de-DE" sz="2000" dirty="0" smtClean="0"/>
-              <a:t>=&gt; Erklärung</a:t>
-            </a:r>
-          </a:p>
-          <a:p>
-            <a:pPr marL="0" indent="0">
-              <a:buNone/>
-            </a:pPr>
-            <a:r>
-              <a:rPr lang="de-DE" sz="2000" dirty="0"/>
-              <a:t>	</a:t>
-            </a:r>
-            <a:r>
-              <a:rPr lang="de-DE" sz="2000" dirty="0" smtClean="0"/>
-              <a:t>=&gt; Besonderheiten</a:t>
-            </a:r>
-            <a:endParaRPr lang="de-DE" sz="2000" dirty="0"/>
+              <a:rPr lang="de-DE" sz="2800" dirty="0" smtClean="0"/>
+              <a:t>Prototyp</a:t>
+            </a:r>
+          </a:p>
+          <a:p>
+            <a:pPr lvl="1"/>
+            <a:r>
+              <a:rPr lang="de-DE" dirty="0" smtClean="0"/>
+              <a:t>Vorstellung</a:t>
+            </a:r>
+            <a:endParaRPr lang="de-DE" dirty="0" smtClean="0"/>
+          </a:p>
+          <a:p>
+            <a:pPr lvl="1"/>
+            <a:r>
+              <a:rPr lang="de-DE" dirty="0" smtClean="0"/>
+              <a:t>Erklärung</a:t>
+            </a:r>
+            <a:endParaRPr lang="de-DE" dirty="0" smtClean="0"/>
+          </a:p>
+          <a:p>
+            <a:pPr lvl="1"/>
+            <a:r>
+              <a:rPr lang="de-DE" dirty="0" smtClean="0"/>
+              <a:t>Besonderheiten</a:t>
+            </a:r>
+            <a:endParaRPr lang="de-DE" dirty="0"/>
           </a:p>
         </p:txBody>
       </p:sp>
@@ -7655,7 +7909,7 @@
   <p:timing>
     <p:tnLst>
       <p:par>
-        <p:cTn id="1" dur="indefinite" restart="never" nodeType="tmRoot"/>
+        <p:cTn xmlns:p14="http://schemas.microsoft.com/office/powerpoint/2010/main" id="1" dur="indefinite" restart="never" nodeType="tmRoot"/>
       </p:par>
     </p:tnLst>
   </p:timing>
@@ -7724,7 +7978,7 @@
         </p:blipFill>
         <p:spPr>
           <a:xfrm>
-            <a:off x="827584" y="1413520"/>
+            <a:off x="755576" y="1412776"/>
             <a:ext cx="7746826" cy="5203092"/>
           </a:xfrm>
           <a:prstGeom prst="rect">
@@ -7745,7 +7999,7 @@
   <p:timing>
     <p:tnLst>
       <p:par>
-        <p:cTn id="1" dur="indefinite" restart="never" nodeType="tmRoot"/>
+        <p:cTn xmlns:p14="http://schemas.microsoft.com/office/powerpoint/2010/main" id="1" dur="indefinite" restart="never" nodeType="tmRoot"/>
       </p:par>
     </p:tnLst>
   </p:timing>
@@ -7814,7 +8068,7 @@
         </p:blipFill>
         <p:spPr>
           <a:xfrm>
-            <a:off x="899591" y="1241090"/>
+            <a:off x="470573" y="1494727"/>
             <a:ext cx="7751805" cy="5206314"/>
           </a:xfrm>
           <a:prstGeom prst="rect">
@@ -7835,7 +8089,7 @@
   <p:timing>
     <p:tnLst>
       <p:par>
-        <p:cTn id="1" dur="indefinite" restart="never" nodeType="tmRoot"/>
+        <p:cTn xmlns:p14="http://schemas.microsoft.com/office/powerpoint/2010/main" id="1" dur="indefinite" restart="never" nodeType="tmRoot"/>
       </p:par>
     </p:tnLst>
   </p:timing>
@@ -7948,7 +8202,7 @@
   <p:timing>
     <p:tnLst>
       <p:par>
-        <p:cTn id="1" dur="indefinite" restart="never" nodeType="tmRoot"/>
+        <p:cTn xmlns:p14="http://schemas.microsoft.com/office/powerpoint/2010/main" id="1" dur="indefinite" restart="never" nodeType="tmRoot"/>
       </p:par>
     </p:tnLst>
   </p:timing>
@@ -8061,7 +8315,7 @@
   <p:timing>
     <p:tnLst>
       <p:par>
-        <p:cTn id="1" dur="indefinite" restart="never" nodeType="tmRoot"/>
+        <p:cTn xmlns:p14="http://schemas.microsoft.com/office/powerpoint/2010/main" id="1" dur="indefinite" restart="never" nodeType="tmRoot"/>
       </p:par>
     </p:tnLst>
   </p:timing>
@@ -8126,7 +8380,7 @@
   <p:timing>
     <p:tnLst>
       <p:par>
-        <p:cTn id="1" dur="indefinite" restart="never" nodeType="tmRoot"/>
+        <p:cTn xmlns:p14="http://schemas.microsoft.com/office/powerpoint/2010/main" id="1" dur="indefinite" restart="never" nodeType="tmRoot"/>
       </p:par>
     </p:tnLst>
   </p:timing>
@@ -8189,7 +8443,7 @@
         </p:nvGraphicFramePr>
         <p:xfrm>
           <a:off x="827583" y="1628800"/>
-          <a:ext cx="7416825" cy="3032760"/>
+          <a:ext cx="7416825" cy="3302000"/>
         </p:xfrm>
         <a:graphic>
           <a:graphicData uri="http://schemas.openxmlformats.org/drawingml/2006/table">
@@ -8504,7 +8758,7 @@
   <p:timing>
     <p:tnLst>
       <p:par>
-        <p:cTn id="1" dur="indefinite" restart="never" nodeType="tmRoot"/>
+        <p:cTn xmlns:p14="http://schemas.microsoft.com/office/powerpoint/2010/main" id="1" dur="indefinite" restart="never" nodeType="tmRoot"/>
       </p:par>
     </p:tnLst>
   </p:timing>
@@ -8594,7 +8848,7 @@
   <p:timing>
     <p:tnLst>
       <p:par>
-        <p:cTn id="1" dur="indefinite" restart="never" nodeType="tmRoot"/>
+        <p:cTn xmlns:p14="http://schemas.microsoft.com/office/powerpoint/2010/main" id="1" dur="indefinite" restart="never" nodeType="tmRoot"/>
       </p:par>
     </p:tnLst>
   </p:timing>
@@ -8602,38 +8856,38 @@
 </file>
 
 <file path=ppt/theme/theme1.xml><?xml version="1.0" encoding="utf-8"?>
-<a:theme xmlns:a="http://schemas.openxmlformats.org/drawingml/2006/main" name="Office Theme">
+<a:theme xmlns:a="http://schemas.openxmlformats.org/drawingml/2006/main" name="Klarheit">
   <a:themeElements>
-    <a:clrScheme name="Office">
+    <a:clrScheme name="Klarheit">
       <a:dk1>
-        <a:sysClr val="windowText" lastClr="000000"/>
+        <a:srgbClr val="292934"/>
       </a:dk1>
       <a:lt1>
-        <a:sysClr val="window" lastClr="FFFFFF"/>
+        <a:srgbClr val="FFFFFF"/>
       </a:lt1>
       <a:dk2>
-        <a:srgbClr val="1F497D"/>
+        <a:srgbClr val="D2533C"/>
       </a:dk2>
       <a:lt2>
-        <a:srgbClr val="EEECE1"/>
+        <a:srgbClr val="F3F2DC"/>
       </a:lt2>
       <a:accent1>
-        <a:srgbClr val="4F81BD"/>
+        <a:srgbClr val="93A299"/>
       </a:accent1>
       <a:accent2>
-        <a:srgbClr val="C0504D"/>
+        <a:srgbClr val="AD8F67"/>
       </a:accent2>
       <a:accent3>
-        <a:srgbClr val="9BBB59"/>
+        <a:srgbClr val="726056"/>
       </a:accent3>
       <a:accent4>
-        <a:srgbClr val="8064A2"/>
+        <a:srgbClr val="4C5A6A"/>
       </a:accent4>
       <a:accent5>
-        <a:srgbClr val="4BACC6"/>
+        <a:srgbClr val="808DA0"/>
       </a:accent5>
       <a:accent6>
-        <a:srgbClr val="F79646"/>
+        <a:srgbClr val="79463D"/>
       </a:accent6>
       <a:hlink>
         <a:srgbClr val="0000FF"/>
@@ -8642,22 +8896,22 @@
         <a:srgbClr val="800080"/>
       </a:folHlink>
     </a:clrScheme>
-    <a:fontScheme name="Office">
+    <a:fontScheme name="Office Klassisch 2">
       <a:majorFont>
-        <a:latin typeface="Calibri"/>
+        <a:latin typeface="Arial"/>
         <a:ea typeface=""/>
         <a:cs typeface=""/>
         <a:font script="Jpan" typeface="ＭＳ Ｐゴシック"/>
-        <a:font script="Hang" typeface="맑은 고딕"/>
-        <a:font script="Hans" typeface="宋体"/>
-        <a:font script="Hant" typeface="新細明體"/>
-        <a:font script="Arab" typeface="Times New Roman"/>
-        <a:font script="Hebr" typeface="Times New Roman"/>
-        <a:font script="Thai" typeface="Angsana New"/>
+        <a:font script="Hang" typeface="돋움"/>
+        <a:font script="Hans" typeface="华文新魏"/>
+        <a:font script="Hant" typeface="微軟正黑體"/>
+        <a:font script="Arab" typeface="Arial"/>
+        <a:font script="Hebr" typeface="Arial"/>
+        <a:font script="Thai" typeface="Cordia New"/>
         <a:font script="Ethi" typeface="Nyala"/>
         <a:font script="Beng" typeface="Vrinda"/>
         <a:font script="Gujr" typeface="Shruti"/>
-        <a:font script="Khmr" typeface="MoolBoran"/>
+        <a:font script="Khmr" typeface="DaunPenh"/>
         <a:font script="Knda" typeface="Tunga"/>
         <a:font script="Guru" typeface="Raavi"/>
         <a:font script="Cans" typeface="Euphemia"/>
@@ -8674,18 +8928,18 @@
         <a:font script="Laoo" typeface="DokChampa"/>
         <a:font script="Sinh" typeface="Iskoola Pota"/>
         <a:font script="Mong" typeface="Mongolian Baiti"/>
-        <a:font script="Viet" typeface="Times New Roman"/>
+        <a:font script="Viet" typeface="Arial"/>
         <a:font script="Uigh" typeface="Microsoft Uighur"/>
         <a:font script="Geor" typeface="Sylfaen"/>
       </a:majorFont>
       <a:minorFont>
-        <a:latin typeface="Calibri"/>
+        <a:latin typeface="Arial"/>
         <a:ea typeface=""/>
         <a:cs typeface=""/>
         <a:font script="Jpan" typeface="ＭＳ Ｐゴシック"/>
-        <a:font script="Hang" typeface="맑은 고딕"/>
-        <a:font script="Hans" typeface="宋体"/>
-        <a:font script="Hant" typeface="新細明體"/>
+        <a:font script="Hang" typeface="돋움"/>
+        <a:font script="Hans" typeface="华文新魏"/>
+        <a:font script="Hant" typeface="微軟正黑體"/>
         <a:font script="Arab" typeface="Arial"/>
         <a:font script="Hebr" typeface="Arial"/>
         <a:font script="Thai" typeface="Cordia New"/>
@@ -8714,7 +8968,7 @@
         <a:font script="Geor" typeface="Sylfaen"/>
       </a:minorFont>
     </a:fontScheme>
-    <a:fmtScheme name="Office">
+    <a:fmtScheme name="Klarheit">
       <a:fillStyleLst>
         <a:solidFill>
           <a:schemeClr val="phClr"/>
@@ -8724,65 +8978,75 @@
             <a:gs pos="0">
               <a:schemeClr val="phClr">
                 <a:tint val="50000"/>
-                <a:satMod val="300000"/>
+                <a:shade val="86000"/>
+                <a:satMod val="140000"/>
               </a:schemeClr>
             </a:gs>
-            <a:gs pos="35000">
+            <a:gs pos="45000">
               <a:schemeClr val="phClr">
-                <a:tint val="37000"/>
-                <a:satMod val="300000"/>
+                <a:tint val="48000"/>
+                <a:satMod val="150000"/>
               </a:schemeClr>
             </a:gs>
             <a:gs pos="100000">
               <a:schemeClr val="phClr">
-                <a:tint val="15000"/>
-                <a:satMod val="350000"/>
+                <a:tint val="28000"/>
+                <a:satMod val="160000"/>
               </a:schemeClr>
             </a:gs>
           </a:gsLst>
-          <a:lin ang="16200000" scaled="1"/>
+          <a:path path="circle">
+            <a:fillToRect l="100000" t="100000" r="100000" b="100000"/>
+          </a:path>
         </a:gradFill>
         <a:gradFill rotWithShape="1">
           <a:gsLst>
             <a:gs pos="0">
               <a:schemeClr val="phClr">
-                <a:shade val="51000"/>
-                <a:satMod val="130000"/>
+                <a:shade val="70000"/>
+                <a:satMod val="150000"/>
               </a:schemeClr>
             </a:gs>
-            <a:gs pos="80000">
+            <a:gs pos="34000">
               <a:schemeClr val="phClr">
-                <a:shade val="93000"/>
-                <a:satMod val="130000"/>
+                <a:shade val="70000"/>
+                <a:satMod val="140000"/>
+              </a:schemeClr>
+            </a:gs>
+            <a:gs pos="70000">
+              <a:schemeClr val="phClr">
+                <a:tint val="100000"/>
+                <a:shade val="90000"/>
+                <a:satMod val="140000"/>
               </a:schemeClr>
             </a:gs>
             <a:gs pos="100000">
               <a:schemeClr val="phClr">
-                <a:shade val="94000"/>
-                <a:satMod val="135000"/>
+                <a:tint val="100000"/>
+                <a:shade val="100000"/>
+                <a:satMod val="100000"/>
               </a:schemeClr>
             </a:gs>
           </a:gsLst>
-          <a:lin ang="16200000" scaled="0"/>
+          <a:path path="circle">
+            <a:fillToRect l="100000" t="100000" r="100000" b="100000"/>
+          </a:path>
         </a:gradFill>
       </a:fillStyleLst>
       <a:lnStyleLst>
         <a:ln w="9525" cap="flat" cmpd="sng" algn="ctr">
           <a:solidFill>
-            <a:schemeClr val="phClr">
-              <a:shade val="95000"/>
-              <a:satMod val="105000"/>
-            </a:schemeClr>
+            <a:schemeClr val="phClr"/>
           </a:solidFill>
           <a:prstDash val="solid"/>
         </a:ln>
-        <a:ln w="25400" cap="flat" cmpd="sng" algn="ctr">
+        <a:ln w="26425" cap="flat" cmpd="sng" algn="ctr">
           <a:solidFill>
             <a:schemeClr val="phClr"/>
           </a:solidFill>
           <a:prstDash val="solid"/>
         </a:ln>
-        <a:ln w="38100" cap="flat" cmpd="sng" algn="ctr">
+        <a:ln w="44450" cap="flat" cmpd="sng" algn="ctr">
           <a:solidFill>
             <a:schemeClr val="phClr"/>
           </a:solidFill>
@@ -8791,28 +9055,22 @@
       </a:lnStyleLst>
       <a:effectStyleLst>
         <a:effectStyle>
+          <a:effectLst/>
+        </a:effectStyle>
+        <a:effectStyle>
           <a:effectLst>
-            <a:outerShdw blurRad="40000" dist="20000" dir="5400000" rotWithShape="0">
+            <a:outerShdw blurRad="38100" dist="25400" dir="2700000" algn="br" rotWithShape="0">
               <a:srgbClr val="000000">
-                <a:alpha val="38000"/>
+                <a:alpha val="60000"/>
               </a:srgbClr>
             </a:outerShdw>
           </a:effectLst>
         </a:effectStyle>
         <a:effectStyle>
           <a:effectLst>
-            <a:outerShdw blurRad="40000" dist="23000" dir="5400000" rotWithShape="0">
+            <a:outerShdw blurRad="38100" dist="25400" dir="2700000" algn="br" rotWithShape="0">
               <a:srgbClr val="000000">
-                <a:alpha val="35000"/>
-              </a:srgbClr>
-            </a:outerShdw>
-          </a:effectLst>
-        </a:effectStyle>
-        <a:effectStyle>
-          <a:effectLst>
-            <a:outerShdw blurRad="40000" dist="23000" dir="5400000" rotWithShape="0">
-              <a:srgbClr val="000000">
-                <a:alpha val="35000"/>
+                <a:alpha val="60000"/>
               </a:srgbClr>
             </a:outerShdw>
           </a:effectLst>
@@ -8820,12 +9078,18 @@
             <a:camera prst="orthographicFront">
               <a:rot lat="0" lon="0" rev="0"/>
             </a:camera>
-            <a:lightRig rig="threePt" dir="t">
-              <a:rot lat="0" lon="0" rev="1200000"/>
+            <a:lightRig rig="balanced" dir="t">
+              <a:rot lat="0" lon="0" rev="5100000"/>
             </a:lightRig>
           </a:scene3d>
-          <a:sp3d>
-            <a:bevelT w="63500" h="25400"/>
+          <a:sp3d contourW="6350">
+            <a:bevelT w="29210" h="12700"/>
+            <a:contourClr>
+              <a:schemeClr val="phClr">
+                <a:shade val="30000"/>
+                <a:satMod val="130000"/>
+              </a:schemeClr>
+            </a:contourClr>
           </a:sp3d>
         </a:effectStyle>
       </a:effectStyleLst>
@@ -8837,47 +9101,40 @@
           <a:gsLst>
             <a:gs pos="0">
               <a:schemeClr val="phClr">
-                <a:tint val="40000"/>
-                <a:satMod val="350000"/>
+                <a:tint val="85000"/>
+                <a:satMod val="180000"/>
               </a:schemeClr>
             </a:gs>
             <a:gs pos="40000">
               <a:schemeClr val="phClr">
-                <a:tint val="45000"/>
-                <a:shade val="99000"/>
-                <a:satMod val="350000"/>
+                <a:tint val="95000"/>
+                <a:shade val="85000"/>
+                <a:satMod val="150000"/>
               </a:schemeClr>
             </a:gs>
             <a:gs pos="100000">
               <a:schemeClr val="phClr">
-                <a:shade val="20000"/>
-                <a:satMod val="255000"/>
-              </a:schemeClr>
-            </a:gs>
-          </a:gsLst>
-          <a:path path="circle">
-            <a:fillToRect l="50000" t="-80000" r="50000" b="180000"/>
-          </a:path>
-        </a:gradFill>
-        <a:gradFill rotWithShape="1">
-          <a:gsLst>
-            <a:gs pos="0">
-              <a:schemeClr val="phClr">
-                <a:tint val="80000"/>
-                <a:satMod val="300000"/>
-              </a:schemeClr>
-            </a:gs>
-            <a:gs pos="100000">
-              <a:schemeClr val="phClr">
-                <a:shade val="30000"/>
+                <a:shade val="45000"/>
                 <a:satMod val="200000"/>
               </a:schemeClr>
             </a:gs>
           </a:gsLst>
-          <a:path path="circle">
-            <a:fillToRect l="50000" t="50000" r="50000" b="50000"/>
-          </a:path>
+          <a:lin ang="5400000" scaled="0"/>
         </a:gradFill>
+        <a:blipFill rotWithShape="1">
+          <a:blip xmlns:r="http://schemas.openxmlformats.org/officeDocument/2006/relationships" r:embed="rId1">
+            <a:duotone>
+              <a:schemeClr val="phClr">
+                <a:shade val="55000"/>
+              </a:schemeClr>
+              <a:schemeClr val="phClr">
+                <a:tint val="97000"/>
+                <a:satMod val="95000"/>
+              </a:schemeClr>
+            </a:duotone>
+          </a:blip>
+          <a:tile tx="0" ty="0" sx="70000" sy="70000" flip="none" algn="tl"/>
+        </a:blipFill>
       </a:bgFillStyleLst>
     </a:fmtScheme>
   </a:themeElements>

</xml_diff>